<commit_message>
code cleaning and also PowerPoint ready now
</commit_message>
<xml_diff>
--- a/Projektiesitys.pptx
+++ b/Projektiesitys.pptx
@@ -12,12 +12,17 @@
     <p:sldId id="268" r:id="rId6"/>
     <p:sldId id="269" r:id="rId7"/>
     <p:sldId id="260" r:id="rId8"/>
-    <p:sldId id="261" r:id="rId9"/>
-    <p:sldId id="262" r:id="rId10"/>
-    <p:sldId id="263" r:id="rId11"/>
-    <p:sldId id="264" r:id="rId12"/>
-    <p:sldId id="265" r:id="rId13"/>
-    <p:sldId id="266" r:id="rId14"/>
+    <p:sldId id="270" r:id="rId9"/>
+    <p:sldId id="271" r:id="rId10"/>
+    <p:sldId id="272" r:id="rId11"/>
+    <p:sldId id="273" r:id="rId12"/>
+    <p:sldId id="261" r:id="rId13"/>
+    <p:sldId id="262" r:id="rId14"/>
+    <p:sldId id="263" r:id="rId15"/>
+    <p:sldId id="274" r:id="rId16"/>
+    <p:sldId id="264" r:id="rId17"/>
+    <p:sldId id="265" r:id="rId18"/>
+    <p:sldId id="266" r:id="rId19"/>
   </p:sldIdLst>
   <p:sldSz cx="12192000" cy="6858000"/>
   <p:notesSz cx="6858000" cy="9144000"/>
@@ -116,6 +121,11 @@
       </a:defRPr>
     </a:lvl9pPr>
   </p:defaultTextStyle>
+  <p:extLst>
+    <p:ext uri="{EFAFB233-063F-42B5-8137-9DF3F51BA10A}">
+      <p15:sldGuideLst xmlns:p15="http://schemas.microsoft.com/office/powerpoint/2012/main"/>
+    </p:ext>
+  </p:extLst>
 </p:presentation>
 </file>
 
@@ -250,7 +260,7 @@
           <a:p>
             <a:fld id="{7B157DBC-5CD4-4E77-A2A4-9871A9F74E15}" type="datetimeFigureOut">
               <a:rPr lang="LID4096" smtClean="0"/>
-              <a:t>04/22/2024</a:t>
+              <a:t>04/25/2024</a:t>
             </a:fld>
             <a:endParaRPr lang="LID4096"/>
           </a:p>
@@ -420,7 +430,7 @@
           <a:p>
             <a:fld id="{7B157DBC-5CD4-4E77-A2A4-9871A9F74E15}" type="datetimeFigureOut">
               <a:rPr lang="LID4096" smtClean="0"/>
-              <a:t>04/22/2024</a:t>
+              <a:t>04/25/2024</a:t>
             </a:fld>
             <a:endParaRPr lang="LID4096"/>
           </a:p>
@@ -600,7 +610,7 @@
           <a:p>
             <a:fld id="{7B157DBC-5CD4-4E77-A2A4-9871A9F74E15}" type="datetimeFigureOut">
               <a:rPr lang="LID4096" smtClean="0"/>
-              <a:t>04/22/2024</a:t>
+              <a:t>04/25/2024</a:t>
             </a:fld>
             <a:endParaRPr lang="LID4096"/>
           </a:p>
@@ -770,7 +780,7 @@
           <a:p>
             <a:fld id="{7B157DBC-5CD4-4E77-A2A4-9871A9F74E15}" type="datetimeFigureOut">
               <a:rPr lang="LID4096" smtClean="0"/>
-              <a:t>04/22/2024</a:t>
+              <a:t>04/25/2024</a:t>
             </a:fld>
             <a:endParaRPr lang="LID4096"/>
           </a:p>
@@ -1016,7 +1026,7 @@
           <a:p>
             <a:fld id="{7B157DBC-5CD4-4E77-A2A4-9871A9F74E15}" type="datetimeFigureOut">
               <a:rPr lang="LID4096" smtClean="0"/>
-              <a:t>04/22/2024</a:t>
+              <a:t>04/25/2024</a:t>
             </a:fld>
             <a:endParaRPr lang="LID4096"/>
           </a:p>
@@ -1248,7 +1258,7 @@
           <a:p>
             <a:fld id="{7B157DBC-5CD4-4E77-A2A4-9871A9F74E15}" type="datetimeFigureOut">
               <a:rPr lang="LID4096" smtClean="0"/>
-              <a:t>04/22/2024</a:t>
+              <a:t>04/25/2024</a:t>
             </a:fld>
             <a:endParaRPr lang="LID4096"/>
           </a:p>
@@ -1615,7 +1625,7 @@
           <a:p>
             <a:fld id="{7B157DBC-5CD4-4E77-A2A4-9871A9F74E15}" type="datetimeFigureOut">
               <a:rPr lang="LID4096" smtClean="0"/>
-              <a:t>04/22/2024</a:t>
+              <a:t>04/25/2024</a:t>
             </a:fld>
             <a:endParaRPr lang="LID4096"/>
           </a:p>
@@ -1733,7 +1743,7 @@
           <a:p>
             <a:fld id="{7B157DBC-5CD4-4E77-A2A4-9871A9F74E15}" type="datetimeFigureOut">
               <a:rPr lang="LID4096" smtClean="0"/>
-              <a:t>04/22/2024</a:t>
+              <a:t>04/25/2024</a:t>
             </a:fld>
             <a:endParaRPr lang="LID4096"/>
           </a:p>
@@ -1828,7 +1838,7 @@
           <a:p>
             <a:fld id="{7B157DBC-5CD4-4E77-A2A4-9871A9F74E15}" type="datetimeFigureOut">
               <a:rPr lang="LID4096" smtClean="0"/>
-              <a:t>04/22/2024</a:t>
+              <a:t>04/25/2024</a:t>
             </a:fld>
             <a:endParaRPr lang="LID4096"/>
           </a:p>
@@ -2105,7 +2115,7 @@
           <a:p>
             <a:fld id="{7B157DBC-5CD4-4E77-A2A4-9871A9F74E15}" type="datetimeFigureOut">
               <a:rPr lang="LID4096" smtClean="0"/>
-              <a:t>04/22/2024</a:t>
+              <a:t>04/25/2024</a:t>
             </a:fld>
             <a:endParaRPr lang="LID4096"/>
           </a:p>
@@ -2362,7 +2372,7 @@
           <a:p>
             <a:fld id="{7B157DBC-5CD4-4E77-A2A4-9871A9F74E15}" type="datetimeFigureOut">
               <a:rPr lang="LID4096" smtClean="0"/>
-              <a:t>04/22/2024</a:t>
+              <a:t>04/25/2024</a:t>
             </a:fld>
             <a:endParaRPr lang="LID4096"/>
           </a:p>
@@ -2575,7 +2585,7 @@
           <a:p>
             <a:fld id="{7B157DBC-5CD4-4E77-A2A4-9871A9F74E15}" type="datetimeFigureOut">
               <a:rPr lang="LID4096" smtClean="0"/>
-              <a:t>04/22/2024</a:t>
+              <a:t>04/25/2024</a:t>
             </a:fld>
             <a:endParaRPr lang="LID4096"/>
           </a:p>
@@ -3547,6 +3557,722 @@
           <p:cNvPr id="4" name="Picture 45">
             <a:extLst>
               <a:ext uri="{FF2B5EF4-FFF2-40B4-BE49-F238E27FC236}">
+                <a16:creationId xmlns:a16="http://schemas.microsoft.com/office/drawing/2014/main" id="{8FFB8CDF-51E7-0D9F-CDCB-19C4798D6344}"/>
+              </a:ext>
+            </a:extLst>
+          </p:cNvPr>
+          <p:cNvPicPr>
+            <a:picLocks noChangeAspect="1"/>
+          </p:cNvPicPr>
+          <p:nvPr/>
+        </p:nvPicPr>
+        <p:blipFill rotWithShape="1">
+          <a:blip r:embed="rId2">
+            <a:duotone>
+              <a:schemeClr val="accent1">
+                <a:shade val="45000"/>
+                <a:satMod val="135000"/>
+              </a:schemeClr>
+              <a:prstClr val="white"/>
+            </a:duotone>
+            <a:alphaModFix amt="35000"/>
+          </a:blip>
+          <a:srcRect t="21071" b="1074"/>
+          <a:stretch/>
+        </p:blipFill>
+        <p:spPr>
+          <a:xfrm>
+            <a:off x="19" y="11"/>
+            <a:ext cx="12191981" cy="6857989"/>
+          </a:xfrm>
+          <a:prstGeom prst="rect">
+            <a:avLst/>
+          </a:prstGeom>
+        </p:spPr>
+      </p:pic>
+      <p:sp>
+        <p:nvSpPr>
+          <p:cNvPr id="2" name="Otsikko 1">
+            <a:extLst>
+              <a:ext uri="{FF2B5EF4-FFF2-40B4-BE49-F238E27FC236}">
+                <a16:creationId xmlns:a16="http://schemas.microsoft.com/office/drawing/2014/main" id="{BE431D21-8862-60A5-5122-A1276708A3A9}"/>
+              </a:ext>
+            </a:extLst>
+          </p:cNvPr>
+          <p:cNvSpPr>
+            <a:spLocks noGrp="1"/>
+          </p:cNvSpPr>
+          <p:nvPr>
+            <p:ph type="title"/>
+          </p:nvPr>
+        </p:nvSpPr>
+        <p:spPr>
+          <a:xfrm>
+            <a:off x="838200" y="365125"/>
+            <a:ext cx="6657975" cy="779463"/>
+          </a:xfrm>
+        </p:spPr>
+        <p:txBody>
+          <a:bodyPr>
+            <a:normAutofit fontScale="90000"/>
+          </a:bodyPr>
+          <a:lstStyle/>
+          <a:p>
+            <a:r>
+              <a:rPr lang="fi-FI" dirty="0"/>
+              <a:t>Koodiesimerkit, ratkaisun esittely</a:t>
+            </a:r>
+            <a:endParaRPr lang="LID4096" dirty="0"/>
+          </a:p>
+        </p:txBody>
+      </p:sp>
+      <p:sp>
+        <p:nvSpPr>
+          <p:cNvPr id="3" name="Sisällön paikkamerkki 2">
+            <a:extLst>
+              <a:ext uri="{FF2B5EF4-FFF2-40B4-BE49-F238E27FC236}">
+                <a16:creationId xmlns:a16="http://schemas.microsoft.com/office/drawing/2014/main" id="{92EF7534-1E9C-0F8B-42D8-338290E58D20}"/>
+              </a:ext>
+            </a:extLst>
+          </p:cNvPr>
+          <p:cNvSpPr>
+            <a:spLocks noGrp="1"/>
+          </p:cNvSpPr>
+          <p:nvPr>
+            <p:ph idx="1"/>
+          </p:nvPr>
+        </p:nvSpPr>
+        <p:spPr/>
+        <p:txBody>
+          <a:bodyPr/>
+          <a:lstStyle/>
+          <a:p>
+            <a:pPr>
+              <a:lnSpc>
+                <a:spcPct val="150000"/>
+              </a:lnSpc>
+            </a:pPr>
+            <a:r>
+              <a:rPr lang="fi-FI" sz="2000" dirty="0" err="1"/>
+              <a:t>Front-end</a:t>
+            </a:r>
+            <a:r>
+              <a:rPr lang="fi-FI" sz="2000" dirty="0"/>
+              <a:t> renderöinti</a:t>
+            </a:r>
+          </a:p>
+          <a:p>
+            <a:endParaRPr lang="fi-FI" dirty="0"/>
+          </a:p>
+          <a:p>
+            <a:endParaRPr lang="LID4096" dirty="0"/>
+          </a:p>
+        </p:txBody>
+      </p:sp>
+      <p:pic>
+        <p:nvPicPr>
+          <p:cNvPr id="7" name="Kuva 6">
+            <a:extLst>
+              <a:ext uri="{FF2B5EF4-FFF2-40B4-BE49-F238E27FC236}">
+                <a16:creationId xmlns:a16="http://schemas.microsoft.com/office/drawing/2014/main" id="{E3D94315-8FAC-A5EB-91F1-70D7BEB08B93}"/>
+              </a:ext>
+            </a:extLst>
+          </p:cNvPr>
+          <p:cNvPicPr>
+            <a:picLocks noChangeAspect="1"/>
+          </p:cNvPicPr>
+          <p:nvPr/>
+        </p:nvPicPr>
+        <p:blipFill>
+          <a:blip r:embed="rId3"/>
+          <a:stretch>
+            <a:fillRect/>
+          </a:stretch>
+        </p:blipFill>
+        <p:spPr>
+          <a:xfrm>
+            <a:off x="2035015" y="2586037"/>
+            <a:ext cx="7886498" cy="3443287"/>
+          </a:xfrm>
+          <a:prstGeom prst="rect">
+            <a:avLst/>
+          </a:prstGeom>
+        </p:spPr>
+      </p:pic>
+    </p:spTree>
+    <p:extLst>
+      <p:ext uri="{BB962C8B-B14F-4D97-AF65-F5344CB8AC3E}">
+        <p14:creationId xmlns:p14="http://schemas.microsoft.com/office/powerpoint/2010/main" val="1561744062"/>
+      </p:ext>
+    </p:extLst>
+  </p:cSld>
+  <p:clrMapOvr>
+    <a:masterClrMapping/>
+  </p:clrMapOvr>
+</p:sld>
+</file>
+
+<file path=ppt/slides/slide11.xml><?xml version="1.0" encoding="utf-8"?>
+<p:sld xmlns:a="http://schemas.openxmlformats.org/drawingml/2006/main" xmlns:r="http://schemas.openxmlformats.org/officeDocument/2006/relationships" xmlns:p="http://schemas.openxmlformats.org/presentationml/2006/main">
+  <p:cSld>
+    <p:spTree>
+      <p:nvGrpSpPr>
+        <p:cNvPr id="1" name=""/>
+        <p:cNvGrpSpPr/>
+        <p:nvPr/>
+      </p:nvGrpSpPr>
+      <p:grpSpPr>
+        <a:xfrm>
+          <a:off x="0" y="0"/>
+          <a:ext cx="0" cy="0"/>
+          <a:chOff x="0" y="0"/>
+          <a:chExt cx="0" cy="0"/>
+        </a:xfrm>
+      </p:grpSpPr>
+      <p:pic>
+        <p:nvPicPr>
+          <p:cNvPr id="4" name="Picture 45">
+            <a:extLst>
+              <a:ext uri="{FF2B5EF4-FFF2-40B4-BE49-F238E27FC236}">
+                <a16:creationId xmlns:a16="http://schemas.microsoft.com/office/drawing/2014/main" id="{8FFB8CDF-51E7-0D9F-CDCB-19C4798D6344}"/>
+              </a:ext>
+            </a:extLst>
+          </p:cNvPr>
+          <p:cNvPicPr>
+            <a:picLocks noChangeAspect="1"/>
+          </p:cNvPicPr>
+          <p:nvPr/>
+        </p:nvPicPr>
+        <p:blipFill rotWithShape="1">
+          <a:blip r:embed="rId2">
+            <a:duotone>
+              <a:schemeClr val="accent1">
+                <a:shade val="45000"/>
+                <a:satMod val="135000"/>
+              </a:schemeClr>
+              <a:prstClr val="white"/>
+            </a:duotone>
+            <a:alphaModFix amt="35000"/>
+          </a:blip>
+          <a:srcRect t="21071" b="1074"/>
+          <a:stretch/>
+        </p:blipFill>
+        <p:spPr>
+          <a:xfrm>
+            <a:off x="19" y="11"/>
+            <a:ext cx="12191981" cy="6857989"/>
+          </a:xfrm>
+          <a:prstGeom prst="rect">
+            <a:avLst/>
+          </a:prstGeom>
+        </p:spPr>
+      </p:pic>
+      <p:sp>
+        <p:nvSpPr>
+          <p:cNvPr id="2" name="Otsikko 1">
+            <a:extLst>
+              <a:ext uri="{FF2B5EF4-FFF2-40B4-BE49-F238E27FC236}">
+                <a16:creationId xmlns:a16="http://schemas.microsoft.com/office/drawing/2014/main" id="{BE431D21-8862-60A5-5122-A1276708A3A9}"/>
+              </a:ext>
+            </a:extLst>
+          </p:cNvPr>
+          <p:cNvSpPr>
+            <a:spLocks noGrp="1"/>
+          </p:cNvSpPr>
+          <p:nvPr>
+            <p:ph type="title"/>
+          </p:nvPr>
+        </p:nvSpPr>
+        <p:spPr>
+          <a:xfrm>
+            <a:off x="838200" y="365125"/>
+            <a:ext cx="6657975" cy="779463"/>
+          </a:xfrm>
+        </p:spPr>
+        <p:txBody>
+          <a:bodyPr>
+            <a:normAutofit fontScale="90000"/>
+          </a:bodyPr>
+          <a:lstStyle/>
+          <a:p>
+            <a:r>
+              <a:rPr lang="fi-FI" dirty="0"/>
+              <a:t>Koodiesimerkit, ratkaisun esittely</a:t>
+            </a:r>
+            <a:endParaRPr lang="LID4096" dirty="0"/>
+          </a:p>
+        </p:txBody>
+      </p:sp>
+      <p:sp>
+        <p:nvSpPr>
+          <p:cNvPr id="3" name="Sisällön paikkamerkki 2">
+            <a:extLst>
+              <a:ext uri="{FF2B5EF4-FFF2-40B4-BE49-F238E27FC236}">
+                <a16:creationId xmlns:a16="http://schemas.microsoft.com/office/drawing/2014/main" id="{92EF7534-1E9C-0F8B-42D8-338290E58D20}"/>
+              </a:ext>
+            </a:extLst>
+          </p:cNvPr>
+          <p:cNvSpPr>
+            <a:spLocks noGrp="1"/>
+          </p:cNvSpPr>
+          <p:nvPr>
+            <p:ph idx="1"/>
+          </p:nvPr>
+        </p:nvSpPr>
+        <p:spPr/>
+        <p:txBody>
+          <a:bodyPr/>
+          <a:lstStyle/>
+          <a:p>
+            <a:pPr>
+              <a:lnSpc>
+                <a:spcPct val="150000"/>
+              </a:lnSpc>
+            </a:pPr>
+            <a:r>
+              <a:rPr lang="fi-FI" sz="2000" dirty="0" err="1"/>
+              <a:t>Front-end</a:t>
+            </a:r>
+            <a:r>
+              <a:rPr lang="fi-FI" sz="2000" dirty="0"/>
+              <a:t> PUT </a:t>
+            </a:r>
+            <a:r>
+              <a:rPr lang="fi-FI" sz="2000" dirty="0" err="1"/>
+              <a:t>method</a:t>
+            </a:r>
+            <a:r>
+              <a:rPr lang="fi-FI" sz="2000" dirty="0"/>
+              <a:t> </a:t>
+            </a:r>
+            <a:r>
+              <a:rPr lang="fi-FI" sz="2000" dirty="0" err="1"/>
+              <a:t>backend</a:t>
+            </a:r>
+            <a:r>
+              <a:rPr lang="fi-FI" sz="2000" dirty="0"/>
+              <a:t> kommunikaatioon</a:t>
+            </a:r>
+          </a:p>
+          <a:p>
+            <a:endParaRPr lang="fi-FI" dirty="0"/>
+          </a:p>
+          <a:p>
+            <a:endParaRPr lang="LID4096" dirty="0"/>
+          </a:p>
+        </p:txBody>
+      </p:sp>
+      <p:pic>
+        <p:nvPicPr>
+          <p:cNvPr id="9" name="Kuva 8">
+            <a:extLst>
+              <a:ext uri="{FF2B5EF4-FFF2-40B4-BE49-F238E27FC236}">
+                <a16:creationId xmlns:a16="http://schemas.microsoft.com/office/drawing/2014/main" id="{DCB68ED6-3FC4-EFC0-30ED-33FD713FED4B}"/>
+              </a:ext>
+            </a:extLst>
+          </p:cNvPr>
+          <p:cNvPicPr>
+            <a:picLocks noChangeAspect="1"/>
+          </p:cNvPicPr>
+          <p:nvPr/>
+        </p:nvPicPr>
+        <p:blipFill>
+          <a:blip r:embed="rId3"/>
+          <a:stretch>
+            <a:fillRect/>
+          </a:stretch>
+        </p:blipFill>
+        <p:spPr>
+          <a:xfrm>
+            <a:off x="2691023" y="2358221"/>
+            <a:ext cx="6054585" cy="4134654"/>
+          </a:xfrm>
+          <a:prstGeom prst="rect">
+            <a:avLst/>
+          </a:prstGeom>
+        </p:spPr>
+      </p:pic>
+    </p:spTree>
+    <p:extLst>
+      <p:ext uri="{BB962C8B-B14F-4D97-AF65-F5344CB8AC3E}">
+        <p14:creationId xmlns:p14="http://schemas.microsoft.com/office/powerpoint/2010/main" val="2754888705"/>
+      </p:ext>
+    </p:extLst>
+  </p:cSld>
+  <p:clrMapOvr>
+    <a:masterClrMapping/>
+  </p:clrMapOvr>
+</p:sld>
+</file>
+
+<file path=ppt/slides/slide12.xml><?xml version="1.0" encoding="utf-8"?>
+<p:sld xmlns:a="http://schemas.openxmlformats.org/drawingml/2006/main" xmlns:r="http://schemas.openxmlformats.org/officeDocument/2006/relationships" xmlns:p="http://schemas.openxmlformats.org/presentationml/2006/main">
+  <p:cSld>
+    <p:spTree>
+      <p:nvGrpSpPr>
+        <p:cNvPr id="1" name=""/>
+        <p:cNvGrpSpPr/>
+        <p:nvPr/>
+      </p:nvGrpSpPr>
+      <p:grpSpPr>
+        <a:xfrm>
+          <a:off x="0" y="0"/>
+          <a:ext cx="0" cy="0"/>
+          <a:chOff x="0" y="0"/>
+          <a:chExt cx="0" cy="0"/>
+        </a:xfrm>
+      </p:grpSpPr>
+      <p:pic>
+        <p:nvPicPr>
+          <p:cNvPr id="4" name="Picture 45">
+            <a:extLst>
+              <a:ext uri="{FF2B5EF4-FFF2-40B4-BE49-F238E27FC236}">
+                <a16:creationId xmlns:a16="http://schemas.microsoft.com/office/drawing/2014/main" id="{99DE5C58-3578-70DA-6AE9-50661CC674A5}"/>
+              </a:ext>
+            </a:extLst>
+          </p:cNvPr>
+          <p:cNvPicPr>
+            <a:picLocks noChangeAspect="1"/>
+          </p:cNvPicPr>
+          <p:nvPr/>
+        </p:nvPicPr>
+        <p:blipFill rotWithShape="1">
+          <a:blip r:embed="rId2">
+            <a:duotone>
+              <a:schemeClr val="accent1">
+                <a:shade val="45000"/>
+                <a:satMod val="135000"/>
+              </a:schemeClr>
+              <a:prstClr val="white"/>
+            </a:duotone>
+            <a:alphaModFix amt="35000"/>
+          </a:blip>
+          <a:srcRect t="21071" b="1074"/>
+          <a:stretch/>
+        </p:blipFill>
+        <p:spPr>
+          <a:xfrm>
+            <a:off x="19" y="0"/>
+            <a:ext cx="12191981" cy="6857989"/>
+          </a:xfrm>
+          <a:prstGeom prst="rect">
+            <a:avLst/>
+          </a:prstGeom>
+        </p:spPr>
+      </p:pic>
+      <p:sp>
+        <p:nvSpPr>
+          <p:cNvPr id="2" name="Otsikko 1">
+            <a:extLst>
+              <a:ext uri="{FF2B5EF4-FFF2-40B4-BE49-F238E27FC236}">
+                <a16:creationId xmlns:a16="http://schemas.microsoft.com/office/drawing/2014/main" id="{AA8F6DCE-FAC4-2E9E-6872-F5440D09E0F7}"/>
+              </a:ext>
+            </a:extLst>
+          </p:cNvPr>
+          <p:cNvSpPr>
+            <a:spLocks noGrp="1"/>
+          </p:cNvSpPr>
+          <p:nvPr>
+            <p:ph type="title"/>
+          </p:nvPr>
+        </p:nvSpPr>
+        <p:spPr/>
+        <p:txBody>
+          <a:bodyPr/>
+          <a:lstStyle/>
+          <a:p>
+            <a:r>
+              <a:rPr lang="fi-FI" dirty="0"/>
+              <a:t>Demo työn toiminnasta</a:t>
+            </a:r>
+            <a:endParaRPr lang="LID4096" dirty="0"/>
+          </a:p>
+        </p:txBody>
+      </p:sp>
+      <p:sp>
+        <p:nvSpPr>
+          <p:cNvPr id="3" name="Sisällön paikkamerkki 2">
+            <a:extLst>
+              <a:ext uri="{FF2B5EF4-FFF2-40B4-BE49-F238E27FC236}">
+                <a16:creationId xmlns:a16="http://schemas.microsoft.com/office/drawing/2014/main" id="{8D951615-1B27-F13E-AC73-506FF12E1EC7}"/>
+              </a:ext>
+            </a:extLst>
+          </p:cNvPr>
+          <p:cNvSpPr>
+            <a:spLocks noGrp="1"/>
+          </p:cNvSpPr>
+          <p:nvPr>
+            <p:ph idx="1"/>
+          </p:nvPr>
+        </p:nvSpPr>
+        <p:spPr/>
+        <p:txBody>
+          <a:bodyPr/>
+          <a:lstStyle/>
+          <a:p>
+            <a:r>
+              <a:rPr lang="fi-FI" dirty="0"/>
+              <a:t>Sovelluksen avaus</a:t>
+            </a:r>
+          </a:p>
+          <a:p>
+            <a:r>
+              <a:rPr lang="fi-FI" dirty="0"/>
+              <a:t>Välilehdet</a:t>
+            </a:r>
+          </a:p>
+          <a:p>
+            <a:r>
+              <a:rPr lang="fi-FI" dirty="0"/>
+              <a:t>CRUD operaatiot</a:t>
+            </a:r>
+          </a:p>
+          <a:p>
+            <a:r>
+              <a:rPr lang="fi-FI" dirty="0" err="1"/>
+              <a:t>FastAPI</a:t>
+            </a:r>
+            <a:r>
+              <a:rPr lang="fi-FI" dirty="0"/>
+              <a:t> /</a:t>
+            </a:r>
+            <a:r>
+              <a:rPr lang="fi-FI" dirty="0" err="1"/>
+              <a:t>docs</a:t>
+            </a:r>
+            <a:r>
+              <a:rPr lang="fi-FI" dirty="0"/>
+              <a:t>#/ -työkalu</a:t>
+            </a:r>
+            <a:endParaRPr lang="LID4096" dirty="0"/>
+          </a:p>
+        </p:txBody>
+      </p:sp>
+    </p:spTree>
+    <p:extLst>
+      <p:ext uri="{BB962C8B-B14F-4D97-AF65-F5344CB8AC3E}">
+        <p14:creationId xmlns:p14="http://schemas.microsoft.com/office/powerpoint/2010/main" val="3728030655"/>
+      </p:ext>
+    </p:extLst>
+  </p:cSld>
+  <p:clrMapOvr>
+    <a:masterClrMapping/>
+  </p:clrMapOvr>
+</p:sld>
+</file>
+
+<file path=ppt/slides/slide13.xml><?xml version="1.0" encoding="utf-8"?>
+<p:sld xmlns:a="http://schemas.openxmlformats.org/drawingml/2006/main" xmlns:r="http://schemas.openxmlformats.org/officeDocument/2006/relationships" xmlns:p="http://schemas.openxmlformats.org/presentationml/2006/main">
+  <p:cSld>
+    <p:spTree>
+      <p:nvGrpSpPr>
+        <p:cNvPr id="1" name=""/>
+        <p:cNvGrpSpPr/>
+        <p:nvPr/>
+      </p:nvGrpSpPr>
+      <p:grpSpPr>
+        <a:xfrm>
+          <a:off x="0" y="0"/>
+          <a:ext cx="0" cy="0"/>
+          <a:chOff x="0" y="0"/>
+          <a:chExt cx="0" cy="0"/>
+        </a:xfrm>
+      </p:grpSpPr>
+      <p:pic>
+        <p:nvPicPr>
+          <p:cNvPr id="4" name="Picture 45">
+            <a:extLst>
+              <a:ext uri="{FF2B5EF4-FFF2-40B4-BE49-F238E27FC236}">
+                <a16:creationId xmlns:a16="http://schemas.microsoft.com/office/drawing/2014/main" id="{84CEB8D4-FA48-FEAD-C838-AB0924A7FF15}"/>
+              </a:ext>
+            </a:extLst>
+          </p:cNvPr>
+          <p:cNvPicPr>
+            <a:picLocks noChangeAspect="1"/>
+          </p:cNvPicPr>
+          <p:nvPr/>
+        </p:nvPicPr>
+        <p:blipFill rotWithShape="1">
+          <a:blip r:embed="rId2">
+            <a:duotone>
+              <a:schemeClr val="accent1">
+                <a:shade val="45000"/>
+                <a:satMod val="135000"/>
+              </a:schemeClr>
+              <a:prstClr val="white"/>
+            </a:duotone>
+            <a:alphaModFix amt="35000"/>
+          </a:blip>
+          <a:srcRect t="21071" b="1074"/>
+          <a:stretch/>
+        </p:blipFill>
+        <p:spPr>
+          <a:xfrm>
+            <a:off x="0" y="0"/>
+            <a:ext cx="12191981" cy="6857989"/>
+          </a:xfrm>
+          <a:prstGeom prst="rect">
+            <a:avLst/>
+          </a:prstGeom>
+        </p:spPr>
+      </p:pic>
+      <p:sp>
+        <p:nvSpPr>
+          <p:cNvPr id="2" name="Otsikko 1">
+            <a:extLst>
+              <a:ext uri="{FF2B5EF4-FFF2-40B4-BE49-F238E27FC236}">
+                <a16:creationId xmlns:a16="http://schemas.microsoft.com/office/drawing/2014/main" id="{5B3ADFCB-E46C-FF1D-6B43-1F4C3E41390F}"/>
+              </a:ext>
+            </a:extLst>
+          </p:cNvPr>
+          <p:cNvSpPr>
+            <a:spLocks noGrp="1"/>
+          </p:cNvSpPr>
+          <p:nvPr>
+            <p:ph type="title"/>
+          </p:nvPr>
+        </p:nvSpPr>
+        <p:spPr/>
+        <p:txBody>
+          <a:bodyPr/>
+          <a:lstStyle/>
+          <a:p>
+            <a:r>
+              <a:rPr lang="fi-FI" dirty="0"/>
+              <a:t>Projektityökalut</a:t>
+            </a:r>
+            <a:endParaRPr lang="LID4096" dirty="0"/>
+          </a:p>
+        </p:txBody>
+      </p:sp>
+      <p:sp>
+        <p:nvSpPr>
+          <p:cNvPr id="3" name="Sisällön paikkamerkki 2">
+            <a:extLst>
+              <a:ext uri="{FF2B5EF4-FFF2-40B4-BE49-F238E27FC236}">
+                <a16:creationId xmlns:a16="http://schemas.microsoft.com/office/drawing/2014/main" id="{C127DD7C-41F7-2596-2659-617CA9F40961}"/>
+              </a:ext>
+            </a:extLst>
+          </p:cNvPr>
+          <p:cNvSpPr>
+            <a:spLocks noGrp="1"/>
+          </p:cNvSpPr>
+          <p:nvPr>
+            <p:ph idx="1"/>
+          </p:nvPr>
+        </p:nvSpPr>
+        <p:spPr/>
+        <p:txBody>
+          <a:bodyPr/>
+          <a:lstStyle/>
+          <a:p>
+            <a:r>
+              <a:rPr lang="fi-FI" dirty="0" err="1"/>
+              <a:t>Github</a:t>
+            </a:r>
+            <a:r>
+              <a:rPr lang="fi-FI" dirty="0"/>
+              <a:t> -versionhallinta	</a:t>
+            </a:r>
+          </a:p>
+          <a:p>
+            <a:r>
+              <a:rPr lang="fi-FI" dirty="0"/>
+              <a:t>Testaus? – </a:t>
+            </a:r>
+            <a:r>
+              <a:rPr lang="fi-FI" dirty="0" err="1"/>
+              <a:t>FastAPI:n</a:t>
+            </a:r>
+            <a:r>
+              <a:rPr lang="fi-FI" dirty="0"/>
+              <a:t> dokumentaatio ja </a:t>
+            </a:r>
+            <a:r>
+              <a:rPr lang="fi-FI" dirty="0" err="1"/>
+              <a:t>konsolilogaus</a:t>
+            </a:r>
+            <a:r>
+              <a:rPr lang="fi-FI" dirty="0"/>
+              <a:t> testaus</a:t>
+            </a:r>
+          </a:p>
+          <a:p>
+            <a:r>
+              <a:rPr lang="fi-FI" dirty="0" err="1"/>
+              <a:t>Discord</a:t>
+            </a:r>
+            <a:r>
+              <a:rPr lang="fi-FI" dirty="0"/>
+              <a:t> kommunikaatioon</a:t>
+            </a:r>
+          </a:p>
+          <a:p>
+            <a:r>
+              <a:rPr lang="fi-FI" dirty="0"/>
+              <a:t>Videopalaverit</a:t>
+            </a:r>
+          </a:p>
+          <a:p>
+            <a:r>
+              <a:rPr lang="fi-FI" dirty="0" err="1"/>
+              <a:t>StackOverflow</a:t>
+            </a:r>
+            <a:endParaRPr lang="fi-FI" dirty="0"/>
+          </a:p>
+          <a:p>
+            <a:pPr lvl="1"/>
+            <a:r>
+              <a:rPr lang="fi-FI" dirty="0"/>
+              <a:t>Muut foorumit</a:t>
+            </a:r>
+          </a:p>
+          <a:p>
+            <a:endParaRPr lang="fi-FI" dirty="0"/>
+          </a:p>
+          <a:p>
+            <a:endParaRPr lang="fi-FI" dirty="0"/>
+          </a:p>
+          <a:p>
+            <a:endParaRPr lang="LID4096" dirty="0"/>
+          </a:p>
+        </p:txBody>
+      </p:sp>
+    </p:spTree>
+    <p:extLst>
+      <p:ext uri="{BB962C8B-B14F-4D97-AF65-F5344CB8AC3E}">
+        <p14:creationId xmlns:p14="http://schemas.microsoft.com/office/powerpoint/2010/main" val="899089043"/>
+      </p:ext>
+    </p:extLst>
+  </p:cSld>
+  <p:clrMapOvr>
+    <a:masterClrMapping/>
+  </p:clrMapOvr>
+</p:sld>
+</file>
+
+<file path=ppt/slides/slide14.xml><?xml version="1.0" encoding="utf-8"?>
+<p:sld xmlns:a="http://schemas.openxmlformats.org/drawingml/2006/main" xmlns:r="http://schemas.openxmlformats.org/officeDocument/2006/relationships" xmlns:p="http://schemas.openxmlformats.org/presentationml/2006/main">
+  <p:cSld>
+    <p:spTree>
+      <p:nvGrpSpPr>
+        <p:cNvPr id="1" name=""/>
+        <p:cNvGrpSpPr/>
+        <p:nvPr/>
+      </p:nvGrpSpPr>
+      <p:grpSpPr>
+        <a:xfrm>
+          <a:off x="0" y="0"/>
+          <a:ext cx="0" cy="0"/>
+          <a:chOff x="0" y="0"/>
+          <a:chExt cx="0" cy="0"/>
+        </a:xfrm>
+      </p:grpSpPr>
+      <p:pic>
+        <p:nvPicPr>
+          <p:cNvPr id="4" name="Picture 45">
+            <a:extLst>
+              <a:ext uri="{FF2B5EF4-FFF2-40B4-BE49-F238E27FC236}">
                 <a16:creationId xmlns:a16="http://schemas.microsoft.com/office/drawing/2014/main" id="{9522D0EB-78BD-D3C1-2C5D-FFFD750FFF3C}"/>
               </a:ext>
             </a:extLst>
@@ -3682,7 +4408,200 @@
 </p:sld>
 </file>
 
-<file path=ppt/slides/slide11.xml><?xml version="1.0" encoding="utf-8"?>
+<file path=ppt/slides/slide15.xml><?xml version="1.0" encoding="utf-8"?>
+<p:sld xmlns:a="http://schemas.openxmlformats.org/drawingml/2006/main" xmlns:r="http://schemas.openxmlformats.org/officeDocument/2006/relationships" xmlns:p="http://schemas.openxmlformats.org/presentationml/2006/main">
+  <p:cSld>
+    <p:spTree>
+      <p:nvGrpSpPr>
+        <p:cNvPr id="1" name=""/>
+        <p:cNvGrpSpPr/>
+        <p:nvPr/>
+      </p:nvGrpSpPr>
+      <p:grpSpPr>
+        <a:xfrm>
+          <a:off x="0" y="0"/>
+          <a:ext cx="0" cy="0"/>
+          <a:chOff x="0" y="0"/>
+          <a:chExt cx="0" cy="0"/>
+        </a:xfrm>
+      </p:grpSpPr>
+      <p:pic>
+        <p:nvPicPr>
+          <p:cNvPr id="4" name="Picture 45">
+            <a:extLst>
+              <a:ext uri="{FF2B5EF4-FFF2-40B4-BE49-F238E27FC236}">
+                <a16:creationId xmlns:a16="http://schemas.microsoft.com/office/drawing/2014/main" id="{9522D0EB-78BD-D3C1-2C5D-FFFD750FFF3C}"/>
+              </a:ext>
+            </a:extLst>
+          </p:cNvPr>
+          <p:cNvPicPr>
+            <a:picLocks noChangeAspect="1"/>
+          </p:cNvPicPr>
+          <p:nvPr/>
+        </p:nvPicPr>
+        <p:blipFill rotWithShape="1">
+          <a:blip r:embed="rId2">
+            <a:duotone>
+              <a:schemeClr val="accent1">
+                <a:shade val="45000"/>
+                <a:satMod val="135000"/>
+              </a:schemeClr>
+              <a:prstClr val="white"/>
+            </a:duotone>
+            <a:alphaModFix amt="35000"/>
+          </a:blip>
+          <a:srcRect t="21071" b="1074"/>
+          <a:stretch/>
+        </p:blipFill>
+        <p:spPr>
+          <a:xfrm>
+            <a:off x="0" y="0"/>
+            <a:ext cx="12191981" cy="6857989"/>
+          </a:xfrm>
+          <a:prstGeom prst="rect">
+            <a:avLst/>
+          </a:prstGeom>
+        </p:spPr>
+      </p:pic>
+      <p:sp>
+        <p:nvSpPr>
+          <p:cNvPr id="2" name="Otsikko 1">
+            <a:extLst>
+              <a:ext uri="{FF2B5EF4-FFF2-40B4-BE49-F238E27FC236}">
+                <a16:creationId xmlns:a16="http://schemas.microsoft.com/office/drawing/2014/main" id="{04555E5A-E480-CF01-49DF-02ABCB3096E5}"/>
+              </a:ext>
+            </a:extLst>
+          </p:cNvPr>
+          <p:cNvSpPr>
+            <a:spLocks noGrp="1"/>
+          </p:cNvSpPr>
+          <p:nvPr>
+            <p:ph type="title"/>
+          </p:nvPr>
+        </p:nvSpPr>
+        <p:spPr/>
+        <p:txBody>
+          <a:bodyPr/>
+          <a:lstStyle/>
+          <a:p>
+            <a:r>
+              <a:rPr lang="fi-FI" dirty="0"/>
+              <a:t>AI työkalut</a:t>
+            </a:r>
+            <a:endParaRPr lang="LID4096" dirty="0"/>
+          </a:p>
+        </p:txBody>
+      </p:sp>
+      <p:sp>
+        <p:nvSpPr>
+          <p:cNvPr id="6" name="Sisällön paikkamerkki 5">
+            <a:extLst>
+              <a:ext uri="{FF2B5EF4-FFF2-40B4-BE49-F238E27FC236}">
+                <a16:creationId xmlns:a16="http://schemas.microsoft.com/office/drawing/2014/main" id="{3C600042-3134-EAEC-AC27-CB188DD6A627}"/>
+              </a:ext>
+            </a:extLst>
+          </p:cNvPr>
+          <p:cNvSpPr>
+            <a:spLocks noGrp="1"/>
+          </p:cNvSpPr>
+          <p:nvPr>
+            <p:ph idx="1"/>
+          </p:nvPr>
+        </p:nvSpPr>
+        <p:spPr>
+          <a:xfrm>
+            <a:off x="838200" y="1838469"/>
+            <a:ext cx="4695825" cy="4338493"/>
+          </a:xfrm>
+        </p:spPr>
+        <p:txBody>
+          <a:bodyPr>
+            <a:normAutofit/>
+          </a:bodyPr>
+          <a:lstStyle/>
+          <a:p>
+            <a:r>
+              <a:rPr lang="fi-FI" sz="2400" dirty="0"/>
+              <a:t>Esimerkkinä kaksi eritapaa hakea tietoa tietokannan rakenteesta</a:t>
+            </a:r>
+          </a:p>
+          <a:p>
+            <a:pPr lvl="1"/>
+            <a:r>
+              <a:rPr lang="fi-FI" sz="2000" dirty="0" err="1"/>
+              <a:t>Inspect</a:t>
+            </a:r>
+            <a:r>
+              <a:rPr lang="fi-FI" sz="2000" dirty="0"/>
+              <a:t>(</a:t>
+            </a:r>
+            <a:r>
+              <a:rPr lang="fi-FI" sz="2000" dirty="0" err="1"/>
+              <a:t>engine</a:t>
+            </a:r>
+            <a:r>
+              <a:rPr lang="fi-FI" sz="2000" dirty="0"/>
+              <a:t>) -&gt; yleiskäyttöisempi ajonaikaiseen skeemojen luomiseen tai muokkaamiseen</a:t>
+            </a:r>
+          </a:p>
+          <a:p>
+            <a:pPr lvl="1"/>
+            <a:r>
+              <a:rPr lang="fi-FI" sz="2000" dirty="0" err="1"/>
+              <a:t>metadata.reflect</a:t>
+            </a:r>
+            <a:r>
+              <a:rPr lang="fi-FI" sz="2000" dirty="0"/>
+              <a:t>() -&gt; lataa koko tietokannan skeeman MetaData –olioon. Tilanteet, jossa on olemassa jo valmis skeema.</a:t>
+            </a:r>
+            <a:endParaRPr lang="LID4096" sz="2000" dirty="0"/>
+          </a:p>
+        </p:txBody>
+      </p:sp>
+      <p:pic>
+        <p:nvPicPr>
+          <p:cNvPr id="8" name="Kuva 7">
+            <a:extLst>
+              <a:ext uri="{FF2B5EF4-FFF2-40B4-BE49-F238E27FC236}">
+                <a16:creationId xmlns:a16="http://schemas.microsoft.com/office/drawing/2014/main" id="{877364ED-B043-5253-5066-1B6FB62F907F}"/>
+              </a:ext>
+            </a:extLst>
+          </p:cNvPr>
+          <p:cNvPicPr>
+            <a:picLocks noChangeAspect="1"/>
+          </p:cNvPicPr>
+          <p:nvPr/>
+        </p:nvPicPr>
+        <p:blipFill>
+          <a:blip r:embed="rId3"/>
+          <a:stretch>
+            <a:fillRect/>
+          </a:stretch>
+        </p:blipFill>
+        <p:spPr>
+          <a:xfrm>
+            <a:off x="5385473" y="217343"/>
+            <a:ext cx="6387417" cy="6423302"/>
+          </a:xfrm>
+          <a:prstGeom prst="rect">
+            <a:avLst/>
+          </a:prstGeom>
+        </p:spPr>
+      </p:pic>
+    </p:spTree>
+    <p:extLst>
+      <p:ext uri="{BB962C8B-B14F-4D97-AF65-F5344CB8AC3E}">
+        <p14:creationId xmlns:p14="http://schemas.microsoft.com/office/powerpoint/2010/main" val="3510332605"/>
+      </p:ext>
+    </p:extLst>
+  </p:cSld>
+  <p:clrMapOvr>
+    <a:masterClrMapping/>
+  </p:clrMapOvr>
+</p:sld>
+</file>
+
+<file path=ppt/slides/slide16.xml><?xml version="1.0" encoding="utf-8"?>
 <p:sld xmlns:a="http://schemas.openxmlformats.org/drawingml/2006/main" xmlns:r="http://schemas.openxmlformats.org/officeDocument/2006/relationships" xmlns:p="http://schemas.openxmlformats.org/presentationml/2006/main">
   <p:cSld>
     <p:spTree>
@@ -3838,7 +4757,7 @@
 </p:sld>
 </file>
 
-<file path=ppt/slides/slide12.xml><?xml version="1.0" encoding="utf-8"?>
+<file path=ppt/slides/slide17.xml><?xml version="1.0" encoding="utf-8"?>
 <p:sld xmlns:a="http://schemas.openxmlformats.org/drawingml/2006/main" xmlns:r="http://schemas.openxmlformats.org/officeDocument/2006/relationships" xmlns:p="http://schemas.openxmlformats.org/presentationml/2006/main">
   <p:cSld>
     <p:spTree>
@@ -3996,7 +4915,7 @@
 </p:sld>
 </file>
 
-<file path=ppt/slides/slide13.xml><?xml version="1.0" encoding="utf-8"?>
+<file path=ppt/slides/slide18.xml><?xml version="1.0" encoding="utf-8"?>
 <p:sld xmlns:a="http://schemas.openxmlformats.org/drawingml/2006/main" xmlns:r="http://schemas.openxmlformats.org/officeDocument/2006/relationships" xmlns:p="http://schemas.openxmlformats.org/presentationml/2006/main">
   <p:cSld>
     <p:spTree>
@@ -4266,41 +5185,92 @@
           <a:bodyPr/>
           <a:lstStyle/>
           <a:p>
-            <a:r>
-              <a:rPr lang="fi-FI" dirty="0"/>
+            <a:pPr>
+              <a:lnSpc>
+                <a:spcPct val="150000"/>
+              </a:lnSpc>
+            </a:pPr>
+            <a:r>
+              <a:rPr lang="fi-FI" sz="2400" dirty="0"/>
               <a:t>Osakedataa keräävä REST API sovellus, jonka tietokanta on pilviserverillä ja ohjelma ajettavissa paikallisesti. </a:t>
             </a:r>
           </a:p>
           <a:p>
-            <a:r>
-              <a:rPr lang="fi-FI" dirty="0"/>
+            <a:pPr>
+              <a:lnSpc>
+                <a:spcPct val="150000"/>
+              </a:lnSpc>
+            </a:pPr>
+            <a:r>
+              <a:rPr lang="fi-FI" sz="2400" dirty="0"/>
               <a:t>Osakedata </a:t>
             </a:r>
             <a:r>
-              <a:rPr lang="fi-FI" dirty="0" err="1"/>
+              <a:rPr lang="fi-FI" sz="2400" dirty="0" err="1"/>
               <a:t>API:mme</a:t>
             </a:r>
             <a:r>
-              <a:rPr lang="fi-FI" dirty="0"/>
+              <a:rPr lang="fi-FI" sz="2400" dirty="0"/>
               <a:t> toteuttaa CRUD toiminnallisuudet</a:t>
             </a:r>
           </a:p>
           <a:p>
-            <a:r>
-              <a:rPr lang="fi-FI" dirty="0"/>
-              <a:t>Data tietokantaan stockdata.org </a:t>
-            </a:r>
-            <a:r>
-              <a:rPr lang="fi-FI" dirty="0" err="1"/>
-              <a:t>APIa</a:t>
-            </a:r>
-            <a:r>
-              <a:rPr lang="fi-FI" dirty="0"/>
+            <a:pPr lvl="1">
+              <a:lnSpc>
+                <a:spcPct val="150000"/>
+              </a:lnSpc>
+            </a:pPr>
+            <a:r>
+              <a:rPr lang="fi-FI" sz="2000" dirty="0" err="1"/>
+              <a:t>Create</a:t>
+            </a:r>
+            <a:r>
+              <a:rPr lang="fi-FI" sz="2000" dirty="0"/>
+              <a:t>, </a:t>
+            </a:r>
+            <a:r>
+              <a:rPr lang="fi-FI" sz="2000" dirty="0" err="1"/>
+              <a:t>read</a:t>
+            </a:r>
+            <a:r>
+              <a:rPr lang="fi-FI" sz="2000" dirty="0"/>
+              <a:t>, </a:t>
+            </a:r>
+            <a:r>
+              <a:rPr lang="fi-FI" sz="2000" dirty="0" err="1"/>
+              <a:t>update</a:t>
+            </a:r>
+            <a:r>
+              <a:rPr lang="fi-FI" sz="2000" dirty="0"/>
+              <a:t>, </a:t>
+            </a:r>
+            <a:r>
+              <a:rPr lang="fi-FI" sz="2000" dirty="0" err="1"/>
+              <a:t>delete</a:t>
+            </a:r>
+            <a:endParaRPr lang="fi-FI" sz="2000" dirty="0"/>
+          </a:p>
+          <a:p>
+            <a:pPr>
+              <a:lnSpc>
+                <a:spcPct val="150000"/>
+              </a:lnSpc>
+            </a:pPr>
+            <a:r>
+              <a:rPr lang="fi-FI" sz="2400" dirty="0"/>
+              <a:t>Datan haku tietokantaan stockdata.org </a:t>
+            </a:r>
+            <a:r>
+              <a:rPr lang="fi-FI" sz="2400" dirty="0" err="1"/>
+              <a:t>API:ta</a:t>
+            </a:r>
+            <a:r>
+              <a:rPr lang="fi-FI" sz="2400" dirty="0"/>
               <a:t> hyödyntäen.</a:t>
             </a:r>
           </a:p>
           <a:p>
-            <a:endParaRPr lang="fi-FI" dirty="0"/>
+            <a:endParaRPr lang="fi-FI" sz="2400" dirty="0"/>
           </a:p>
           <a:p>
             <a:endParaRPr lang="LID4096" dirty="0"/>
@@ -4422,56 +5392,116 @@
         </p:nvSpPr>
         <p:spPr/>
         <p:txBody>
-          <a:bodyPr/>
-          <a:lstStyle/>
-          <a:p>
-            <a:r>
-              <a:rPr lang="fi-FI" dirty="0"/>
+          <a:bodyPr>
+            <a:normAutofit/>
+          </a:bodyPr>
+          <a:lstStyle/>
+          <a:p>
+            <a:pPr>
+              <a:lnSpc>
+                <a:spcPct val="150000"/>
+              </a:lnSpc>
+            </a:pPr>
+            <a:r>
+              <a:rPr lang="fi-FI" sz="2000" dirty="0"/>
+              <a:t>Python, </a:t>
+            </a:r>
+            <a:r>
+              <a:rPr lang="fi-FI" sz="2000" dirty="0" err="1"/>
+              <a:t>JavaScirpt</a:t>
+            </a:r>
+            <a:r>
+              <a:rPr lang="fi-FI" sz="2000" dirty="0"/>
+              <a:t> –ohjelmointikielinä</a:t>
+            </a:r>
+          </a:p>
+          <a:p>
+            <a:pPr>
+              <a:lnSpc>
+                <a:spcPct val="150000"/>
+              </a:lnSpc>
+            </a:pPr>
+            <a:r>
+              <a:rPr lang="fi-FI" sz="2000" dirty="0"/>
               <a:t>Serverin keskustelu </a:t>
             </a:r>
             <a:r>
-              <a:rPr lang="fi-FI" dirty="0" err="1"/>
+              <a:rPr lang="fi-FI" sz="2000" dirty="0" err="1"/>
               <a:t>uvicorn</a:t>
             </a:r>
             <a:r>
-              <a:rPr lang="fi-FI" dirty="0"/>
+              <a:rPr lang="fi-FI" sz="2000" dirty="0"/>
               <a:t> asynkronisesti</a:t>
             </a:r>
           </a:p>
           <a:p>
-            <a:r>
-              <a:rPr lang="fi-FI" dirty="0" err="1"/>
+            <a:pPr>
+              <a:lnSpc>
+                <a:spcPct val="150000"/>
+              </a:lnSpc>
+            </a:pPr>
+            <a:r>
+              <a:rPr lang="fi-FI" sz="2000" dirty="0" err="1"/>
               <a:t>Pydantic</a:t>
             </a:r>
             <a:r>
-              <a:rPr lang="fi-FI" dirty="0"/>
+              <a:rPr lang="fi-FI" sz="2000" dirty="0"/>
               <a:t> –kirjasto datamallien varmentamiseen </a:t>
             </a:r>
           </a:p>
           <a:p>
-            <a:r>
-              <a:rPr lang="fi-FI" dirty="0" err="1"/>
+            <a:pPr>
+              <a:lnSpc>
+                <a:spcPct val="150000"/>
+              </a:lnSpc>
+            </a:pPr>
+            <a:r>
+              <a:rPr lang="fi-FI" sz="2000" dirty="0" err="1"/>
               <a:t>FastAPI</a:t>
             </a:r>
             <a:r>
-              <a:rPr lang="fi-FI" dirty="0"/>
+              <a:rPr lang="fi-FI" sz="2000" dirty="0"/>
               <a:t> – web kehyksenä</a:t>
             </a:r>
           </a:p>
           <a:p>
-            <a:r>
-              <a:rPr lang="fi-FI" dirty="0"/>
+            <a:pPr>
+              <a:lnSpc>
+                <a:spcPct val="150000"/>
+              </a:lnSpc>
+            </a:pPr>
+            <a:r>
+              <a:rPr lang="fi-FI" sz="2000" dirty="0"/>
               <a:t>SQL </a:t>
             </a:r>
             <a:r>
-              <a:rPr lang="fi-FI" dirty="0" err="1"/>
+              <a:rPr lang="fi-FI" sz="2000" dirty="0" err="1"/>
               <a:t>Alchemy</a:t>
             </a:r>
             <a:r>
-              <a:rPr lang="fi-FI" dirty="0"/>
+              <a:rPr lang="fi-FI" sz="2000" dirty="0"/>
               <a:t> – ratkaisee tietokantaliikenteen</a:t>
             </a:r>
-            <a:endParaRPr lang="LID4096" dirty="0"/>
+          </a:p>
+          <a:p>
+            <a:pPr>
+              <a:lnSpc>
+                <a:spcPct val="150000"/>
+              </a:lnSpc>
+            </a:pPr>
+            <a:r>
+              <a:rPr lang="fi-FI" sz="2000" dirty="0"/>
+              <a:t>Datamallin </a:t>
+            </a:r>
+            <a:r>
+              <a:rPr lang="fi-FI" sz="2000" dirty="0" err="1"/>
+              <a:t>sunnittelu</a:t>
+            </a:r>
+            <a:r>
+              <a:rPr lang="fi-FI" sz="2000" dirty="0"/>
+              <a:t>, toiminnallisuuksien suunnittelu</a:t>
+            </a:r>
+            <a:endParaRPr lang="LID4096" sz="2000" dirty="0"/>
           </a:p>
         </p:txBody>
       </p:sp>
@@ -4569,7 +5599,7 @@
         </p:nvSpPr>
         <p:spPr>
           <a:xfrm>
-            <a:off x="1048871" y="820271"/>
+            <a:off x="686921" y="128121"/>
             <a:ext cx="9911050" cy="1649974"/>
           </a:xfrm>
         </p:spPr>
@@ -4613,22 +5643,32 @@
         </p:nvSpPr>
         <p:spPr>
           <a:xfrm>
-            <a:off x="1411941" y="1965961"/>
+            <a:off x="686921" y="1381761"/>
             <a:ext cx="9547980" cy="4274120"/>
           </a:xfrm>
         </p:spPr>
         <p:txBody>
           <a:bodyPr anchor="ctr">
-            <a:normAutofit/>
+            <a:normAutofit lnSpcReduction="10000"/>
           </a:bodyPr>
           <a:lstStyle/>
           <a:p>
+            <a:pPr>
+              <a:lnSpc>
+                <a:spcPct val="150000"/>
+              </a:lnSpc>
+            </a:pPr>
             <a:r>
               <a:rPr lang="fi-FI" sz="2000" dirty="0"/>
               <a:t>Serveripuoli Python</a:t>
             </a:r>
           </a:p>
           <a:p>
+            <a:pPr>
+              <a:lnSpc>
+                <a:spcPct val="150000"/>
+              </a:lnSpc>
+            </a:pPr>
             <a:r>
               <a:rPr lang="fi-FI" sz="2000" dirty="0"/>
               <a:t>Kehykset(</a:t>
@@ -4643,141 +5683,170 @@
             </a:r>
           </a:p>
           <a:p>
+            <a:pPr lvl="1">
+              <a:lnSpc>
+                <a:spcPct val="150000"/>
+              </a:lnSpc>
+            </a:pPr>
+            <a:r>
+              <a:rPr lang="fi-FI" sz="1600" dirty="0"/>
+              <a:t>SQL </a:t>
+            </a:r>
+            <a:r>
+              <a:rPr lang="fi-FI" sz="1600" dirty="0" err="1"/>
+              <a:t>Alchemy</a:t>
+            </a:r>
+            <a:r>
+              <a:rPr lang="fi-FI" sz="1600" dirty="0"/>
+              <a:t> – keino keskustella SQL tietokannan kanssa ja kartoittaa dataa olioista relaatioiksi.</a:t>
+            </a:r>
+          </a:p>
+          <a:p>
+            <a:pPr lvl="1">
+              <a:lnSpc>
+                <a:spcPct val="150000"/>
+              </a:lnSpc>
+            </a:pPr>
+            <a:r>
+              <a:rPr lang="fi-FI" sz="1600" dirty="0" err="1"/>
+              <a:t>FastAPI</a:t>
+            </a:r>
+            <a:r>
+              <a:rPr lang="fi-FI" sz="1600" dirty="0"/>
+              <a:t> – Pythonin avuksi rakennettu </a:t>
+            </a:r>
+            <a:r>
+              <a:rPr lang="fi-FI" sz="1600" dirty="0" err="1"/>
+              <a:t>APIn</a:t>
+            </a:r>
+            <a:r>
+              <a:rPr lang="fi-FI" sz="1600" dirty="0"/>
+              <a:t> kehittämiseen tarkoitettu web-kehys. </a:t>
+            </a:r>
+          </a:p>
+          <a:p>
+            <a:pPr>
+              <a:lnSpc>
+                <a:spcPct val="150000"/>
+              </a:lnSpc>
+            </a:pPr>
+            <a:r>
+              <a:rPr lang="fi-FI" sz="2000" dirty="0"/>
+              <a:t>Kirjastot/työkalut</a:t>
+            </a:r>
+          </a:p>
+          <a:p>
+            <a:pPr lvl="1">
+              <a:lnSpc>
+                <a:spcPct val="150000"/>
+              </a:lnSpc>
+            </a:pPr>
+            <a:r>
+              <a:rPr lang="fi-FI" sz="1600" dirty="0" err="1"/>
+              <a:t>Pydantic</a:t>
+            </a:r>
+            <a:r>
+              <a:rPr lang="fi-FI" sz="1600" dirty="0"/>
+              <a:t> – Datan varmentamiseen ja mallintamisen aputyökalu.</a:t>
+            </a:r>
+          </a:p>
+          <a:p>
+            <a:pPr lvl="1">
+              <a:lnSpc>
+                <a:spcPct val="150000"/>
+              </a:lnSpc>
+            </a:pPr>
+            <a:r>
+              <a:rPr lang="fi-FI" sz="1600" dirty="0" err="1"/>
+              <a:t>Uvicorn</a:t>
+            </a:r>
+            <a:r>
+              <a:rPr lang="fi-FI" sz="1600" dirty="0"/>
+              <a:t> – työkalu asynkronisen sovelluksen kehittämiseen</a:t>
+            </a:r>
+          </a:p>
+          <a:p>
+            <a:pPr lvl="1">
+              <a:lnSpc>
+                <a:spcPct val="150000"/>
+              </a:lnSpc>
+            </a:pPr>
+            <a:r>
+              <a:rPr lang="fi-FI" sz="1600" dirty="0" err="1"/>
+              <a:t>PyODBC</a:t>
+            </a:r>
+            <a:r>
+              <a:rPr lang="fi-FI" sz="1600" dirty="0"/>
+              <a:t> – open </a:t>
+            </a:r>
+            <a:r>
+              <a:rPr lang="fi-FI" sz="1600" dirty="0" err="1"/>
+              <a:t>database</a:t>
+            </a:r>
+            <a:r>
+              <a:rPr lang="fi-FI" sz="1600" dirty="0"/>
+              <a:t> </a:t>
+            </a:r>
+            <a:r>
+              <a:rPr lang="fi-FI" sz="1600" dirty="0" err="1"/>
+              <a:t>connectivity</a:t>
+            </a:r>
+            <a:r>
+              <a:rPr lang="fi-FI" sz="1600" dirty="0"/>
+              <a:t> – MS SQL Serverin yhdistämisen apuna</a:t>
+            </a:r>
+          </a:p>
+          <a:p>
+            <a:pPr lvl="1">
+              <a:lnSpc>
+                <a:spcPct val="150000"/>
+              </a:lnSpc>
+            </a:pPr>
+            <a:r>
+              <a:rPr lang="fi-FI" sz="1600" dirty="0"/>
+              <a:t>Muita: </a:t>
+            </a:r>
+            <a:r>
+              <a:rPr lang="fi-FI" sz="1600" dirty="0" err="1"/>
+              <a:t>datetime</a:t>
+            </a:r>
+            <a:r>
+              <a:rPr lang="fi-FI" sz="1600" dirty="0"/>
+              <a:t>, </a:t>
+            </a:r>
+            <a:r>
+              <a:rPr lang="fi-FI" sz="1600" dirty="0" err="1"/>
+              <a:t>json</a:t>
+            </a:r>
+            <a:r>
+              <a:rPr lang="fi-FI" sz="1600" dirty="0"/>
+              <a:t>, </a:t>
+            </a:r>
+            <a:r>
+              <a:rPr lang="fi-FI" sz="1600" dirty="0" err="1"/>
+              <a:t>os</a:t>
+            </a:r>
+            <a:r>
+              <a:rPr lang="fi-FI" sz="1600" dirty="0"/>
+              <a:t>, </a:t>
+            </a:r>
+            <a:r>
+              <a:rPr lang="fi-FI" sz="1600" dirty="0" err="1"/>
+              <a:t>requests</a:t>
+            </a:r>
+            <a:r>
+              <a:rPr lang="fi-FI" sz="1600" dirty="0"/>
+              <a:t>, </a:t>
+            </a:r>
+            <a:r>
+              <a:rPr lang="fi-FI" sz="1600" dirty="0" err="1"/>
+              <a:t>logging</a:t>
+            </a:r>
+            <a:endParaRPr lang="fi-FI" sz="1600" dirty="0"/>
+          </a:p>
+          <a:p>
             <a:pPr lvl="1"/>
-            <a:r>
-              <a:rPr lang="fi-FI" sz="1400" dirty="0"/>
-              <a:t>SQL </a:t>
-            </a:r>
-            <a:r>
-              <a:rPr lang="fi-FI" sz="1400" dirty="0" err="1"/>
-              <a:t>Alchemy</a:t>
-            </a:r>
-            <a:r>
-              <a:rPr lang="fi-FI" sz="1400" dirty="0"/>
-              <a:t> – keino keskustella SQL tietokannan kanssa ja kartoittaa dataa olioista relaatioiksi.</a:t>
-            </a:r>
-          </a:p>
-          <a:p>
-            <a:pPr lvl="1"/>
-            <a:r>
-              <a:rPr lang="fi-FI" sz="1400" dirty="0" err="1"/>
-              <a:t>FastAPI</a:t>
-            </a:r>
-            <a:r>
-              <a:rPr lang="fi-FI" sz="1400" dirty="0"/>
-              <a:t> – Pythonin avuksi rakennettu </a:t>
-            </a:r>
-            <a:r>
-              <a:rPr lang="fi-FI" sz="1400" dirty="0" err="1"/>
-              <a:t>APIn</a:t>
-            </a:r>
-            <a:r>
-              <a:rPr lang="fi-FI" sz="1400" dirty="0"/>
-              <a:t> kehittämiseen tarkoitettu web-kehys. </a:t>
-            </a:r>
-          </a:p>
-          <a:p>
-            <a:r>
-              <a:rPr lang="fi-FI" sz="1600" dirty="0"/>
-              <a:t>Kirjastot/työkalut</a:t>
-            </a:r>
-          </a:p>
-          <a:p>
-            <a:pPr lvl="1"/>
-            <a:r>
-              <a:rPr lang="fi-FI" sz="1400" dirty="0" err="1"/>
-              <a:t>Pydantic</a:t>
-            </a:r>
-            <a:r>
-              <a:rPr lang="fi-FI" sz="1400" dirty="0"/>
-              <a:t> – Datan varmentamiseen ja mallintamisen aputyökalu.</a:t>
-            </a:r>
-          </a:p>
-          <a:p>
-            <a:pPr lvl="1"/>
-            <a:r>
-              <a:rPr lang="fi-FI" sz="1400" dirty="0" err="1"/>
-              <a:t>Uvicorn</a:t>
-            </a:r>
-            <a:r>
-              <a:rPr lang="fi-FI" sz="1400" dirty="0"/>
-              <a:t> – työkalu asynkronisen sovelluksen kehittämiseen</a:t>
-            </a:r>
-          </a:p>
-          <a:p>
-            <a:pPr lvl="1"/>
-            <a:r>
-              <a:rPr lang="fi-FI" sz="1400" dirty="0" err="1"/>
-              <a:t>PyODBC</a:t>
-            </a:r>
-            <a:r>
-              <a:rPr lang="fi-FI" sz="1400" dirty="0"/>
-              <a:t> – open </a:t>
-            </a:r>
-            <a:r>
-              <a:rPr lang="fi-FI" sz="1400" dirty="0" err="1"/>
-              <a:t>database</a:t>
-            </a:r>
-            <a:r>
-              <a:rPr lang="fi-FI" sz="1400" dirty="0"/>
-              <a:t> </a:t>
-            </a:r>
-            <a:r>
-              <a:rPr lang="fi-FI" sz="1400" dirty="0" err="1"/>
-              <a:t>connectivity</a:t>
-            </a:r>
-            <a:r>
-              <a:rPr lang="fi-FI" sz="1400" dirty="0"/>
-              <a:t> – MS SQL Serverin yhdistämisen apuna</a:t>
-            </a:r>
-          </a:p>
-          <a:p>
-            <a:pPr lvl="1"/>
-            <a:r>
-              <a:rPr lang="fi-FI" sz="1400" dirty="0"/>
-              <a:t>Muita: </a:t>
-            </a:r>
-            <a:r>
-              <a:rPr lang="fi-FI" sz="1400" dirty="0" err="1"/>
-              <a:t>datetime</a:t>
-            </a:r>
-            <a:r>
-              <a:rPr lang="fi-FI" sz="1400" dirty="0"/>
-              <a:t>, </a:t>
-            </a:r>
-            <a:r>
-              <a:rPr lang="fi-FI" sz="1400" dirty="0" err="1"/>
-              <a:t>json</a:t>
-            </a:r>
-            <a:r>
-              <a:rPr lang="fi-FI" sz="1400" dirty="0"/>
-              <a:t>, </a:t>
-            </a:r>
-            <a:r>
-              <a:rPr lang="fi-FI" sz="1400" dirty="0" err="1"/>
-              <a:t>os</a:t>
-            </a:r>
-            <a:r>
-              <a:rPr lang="fi-FI" sz="1400" dirty="0"/>
-              <a:t>, </a:t>
-            </a:r>
-            <a:r>
-              <a:rPr lang="fi-FI" sz="1400" dirty="0" err="1"/>
-              <a:t>requests</a:t>
-            </a:r>
-            <a:r>
-              <a:rPr lang="fi-FI" sz="1400" dirty="0"/>
-              <a:t>, </a:t>
-            </a:r>
-            <a:r>
-              <a:rPr lang="fi-FI" sz="1400" dirty="0" err="1"/>
-              <a:t>loffinf</a:t>
-            </a:r>
             <a:endParaRPr lang="fi-FI" sz="1400" dirty="0"/>
-          </a:p>
-          <a:p>
-            <a:pPr lvl="1"/>
-            <a:endParaRPr lang="fi-FI" sz="1200" dirty="0"/>
           </a:p>
           <a:p>
             <a:pPr lvl="1"/>
@@ -4795,13 +5864,13 @@
   <p:clrMapOvr>
     <a:masterClrMapping/>
   </p:clrMapOvr>
-  <mc:AlternateContent xmlns:mc="http://schemas.openxmlformats.org/markup-compatibility/2006">
-    <mc:Choice xmlns:p14="http://schemas.microsoft.com/office/powerpoint/2010/main" Requires="p14">
+  <mc:AlternateContent xmlns:mc="http://schemas.openxmlformats.org/markup-compatibility/2006" xmlns:p14="http://schemas.microsoft.com/office/powerpoint/2010/main">
+    <mc:Choice Requires="p14">
       <p:transition spd="med" p14:dur="700">
         <p:fade/>
       </p:transition>
     </mc:Choice>
-    <mc:Fallback>
+    <mc:Fallback xmlns="">
       <p:transition spd="med">
         <p:fade/>
       </p:transition>
@@ -4883,7 +5952,7 @@
         </p:nvSpPr>
         <p:spPr>
           <a:xfrm>
-            <a:off x="1048871" y="820271"/>
+            <a:off x="731371" y="102721"/>
             <a:ext cx="9911050" cy="1649974"/>
           </a:xfrm>
         </p:spPr>
@@ -4927,8 +5996,8 @@
         </p:nvSpPr>
         <p:spPr>
           <a:xfrm>
-            <a:off x="1411941" y="1965961"/>
-            <a:ext cx="9547980" cy="4274120"/>
+            <a:off x="731371" y="1289049"/>
+            <a:ext cx="9612779" cy="4025901"/>
           </a:xfrm>
         </p:spPr>
         <p:txBody>
@@ -4937,6 +6006,11 @@
           </a:bodyPr>
           <a:lstStyle/>
           <a:p>
+            <a:pPr algn="just">
+              <a:lnSpc>
+                <a:spcPct val="150000"/>
+              </a:lnSpc>
+            </a:pPr>
             <a:r>
               <a:rPr lang="fi-FI" sz="2000" dirty="0"/>
               <a:t>Asiakaspuoli JavaScript (React.js </a:t>
@@ -4951,13 +6025,22 @@
             </a:r>
           </a:p>
           <a:p>
+            <a:pPr algn="just">
+              <a:lnSpc>
+                <a:spcPct val="150000"/>
+              </a:lnSpc>
+            </a:pPr>
             <a:r>
               <a:rPr lang="fi-FI" sz="2000" dirty="0"/>
               <a:t>Kirjastot</a:t>
             </a:r>
           </a:p>
           <a:p>
-            <a:pPr lvl="1"/>
+            <a:pPr lvl="1" algn="just">
+              <a:lnSpc>
+                <a:spcPct val="150000"/>
+              </a:lnSpc>
+            </a:pPr>
             <a:r>
               <a:rPr lang="fi-FI" sz="1600" dirty="0" err="1"/>
               <a:t>React</a:t>
@@ -4968,7 +6051,11 @@
             </a:r>
           </a:p>
           <a:p>
-            <a:pPr lvl="1"/>
+            <a:pPr lvl="1" algn="just">
+              <a:lnSpc>
+                <a:spcPct val="150000"/>
+              </a:lnSpc>
+            </a:pPr>
             <a:r>
               <a:rPr lang="fi-FI" sz="1600" dirty="0" err="1"/>
               <a:t>React-dom</a:t>
@@ -4979,7 +6066,11 @@
             </a:r>
           </a:p>
           <a:p>
-            <a:pPr lvl="1"/>
+            <a:pPr lvl="1" algn="just">
+              <a:lnSpc>
+                <a:spcPct val="150000"/>
+              </a:lnSpc>
+            </a:pPr>
             <a:r>
               <a:rPr lang="fi-FI" sz="1600" dirty="0" err="1"/>
               <a:t>Axios</a:t>
@@ -4990,7 +6081,11 @@
             </a:r>
           </a:p>
           <a:p>
-            <a:pPr lvl="1"/>
+            <a:pPr lvl="1" algn="just">
+              <a:lnSpc>
+                <a:spcPct val="150000"/>
+              </a:lnSpc>
+            </a:pPr>
             <a:r>
               <a:rPr lang="fi-FI" sz="1600" dirty="0" err="1"/>
               <a:t>Material</a:t>
@@ -5001,6 +6096,11 @@
             </a:r>
           </a:p>
           <a:p>
+            <a:pPr algn="just">
+              <a:lnSpc>
+                <a:spcPct val="150000"/>
+              </a:lnSpc>
+            </a:pPr>
             <a:r>
               <a:rPr lang="fi-FI" sz="2000" dirty="0"/>
               <a:t>Tietokanta Microsoft SQL Server ja </a:t>
@@ -5035,13 +6135,13 @@
   <p:clrMapOvr>
     <a:masterClrMapping/>
   </p:clrMapOvr>
-  <mc:AlternateContent xmlns:mc="http://schemas.openxmlformats.org/markup-compatibility/2006">
-    <mc:Choice xmlns:p14="http://schemas.microsoft.com/office/powerpoint/2010/main" Requires="p14">
+  <mc:AlternateContent xmlns:mc="http://schemas.openxmlformats.org/markup-compatibility/2006" xmlns:p14="http://schemas.microsoft.com/office/powerpoint/2010/main">
+    <mc:Choice Requires="p14">
       <p:transition spd="med" p14:dur="700">
         <p:fade/>
       </p:transition>
     </mc:Choice>
-    <mc:Fallback>
+    <mc:Fallback xmlns="">
       <p:transition spd="med">
         <p:fade/>
       </p:transition>
@@ -5123,7 +6223,7 @@
         </p:nvSpPr>
         <p:spPr>
           <a:xfrm>
-            <a:off x="1048871" y="820271"/>
+            <a:off x="686921" y="157999"/>
             <a:ext cx="9911050" cy="1649974"/>
           </a:xfrm>
         </p:spPr>
@@ -5159,7 +6259,7 @@
         </p:nvSpPr>
         <p:spPr>
           <a:xfrm>
-            <a:off x="1411941" y="1965961"/>
+            <a:off x="686921" y="1433836"/>
             <a:ext cx="9547980" cy="4274120"/>
           </a:xfrm>
         </p:spPr>
@@ -5169,13 +6269,22 @@
           </a:bodyPr>
           <a:lstStyle/>
           <a:p>
+            <a:pPr>
+              <a:lnSpc>
+                <a:spcPct val="150000"/>
+              </a:lnSpc>
+            </a:pPr>
             <a:r>
               <a:rPr lang="fi-FI" sz="2000" dirty="0"/>
               <a:t>Käytetyt tietokannat</a:t>
             </a:r>
           </a:p>
           <a:p>
-            <a:pPr lvl="1"/>
+            <a:pPr lvl="1">
+              <a:lnSpc>
+                <a:spcPct val="150000"/>
+              </a:lnSpc>
+            </a:pPr>
             <a:r>
               <a:rPr lang="fi-FI" sz="1600" dirty="0"/>
               <a:t>Google </a:t>
@@ -5190,7 +6299,11 @@
             </a:r>
           </a:p>
           <a:p>
-            <a:pPr lvl="1"/>
+            <a:pPr lvl="1">
+              <a:lnSpc>
+                <a:spcPct val="150000"/>
+              </a:lnSpc>
+            </a:pPr>
             <a:r>
               <a:rPr lang="fi-FI" sz="1600" dirty="0" err="1"/>
               <a:t>Azure</a:t>
@@ -5209,34 +6322,55 @@
             </a:r>
           </a:p>
           <a:p>
-            <a:pPr lvl="1"/>
+            <a:pPr lvl="1">
+              <a:lnSpc>
+                <a:spcPct val="150000"/>
+              </a:lnSpc>
+            </a:pPr>
             <a:r>
               <a:rPr lang="fi-FI" sz="1600" dirty="0"/>
               <a:t>Microsoft SQL Server, Server Management Studio</a:t>
             </a:r>
           </a:p>
           <a:p>
+            <a:pPr>
+              <a:lnSpc>
+                <a:spcPct val="150000"/>
+              </a:lnSpc>
+            </a:pPr>
             <a:r>
               <a:rPr lang="fi-FI" sz="2000" dirty="0"/>
               <a:t>Tietokantojen ongelmat</a:t>
             </a:r>
           </a:p>
           <a:p>
-            <a:pPr lvl="1"/>
+            <a:pPr lvl="1">
+              <a:lnSpc>
+                <a:spcPct val="150000"/>
+              </a:lnSpc>
+            </a:pPr>
             <a:r>
               <a:rPr lang="fi-FI" sz="1600" dirty="0"/>
               <a:t>Maksullisuus ja hinnoittelu</a:t>
             </a:r>
           </a:p>
           <a:p>
-            <a:pPr lvl="1"/>
+            <a:pPr lvl="1">
+              <a:lnSpc>
+                <a:spcPct val="150000"/>
+              </a:lnSpc>
+            </a:pPr>
             <a:r>
               <a:rPr lang="fi-FI" sz="1600" dirty="0"/>
               <a:t>Ilmaisversioiden kapasiteetti</a:t>
             </a:r>
           </a:p>
           <a:p>
-            <a:pPr lvl="1"/>
+            <a:pPr lvl="1">
+              <a:lnSpc>
+                <a:spcPct val="150000"/>
+              </a:lnSpc>
+            </a:pPr>
             <a:r>
               <a:rPr lang="fi-FI" sz="1600" dirty="0"/>
               <a:t>Alkuun yhdistäminen ja ajurien valinta</a:t>
@@ -5257,13 +6391,13 @@
   <p:clrMapOvr>
     <a:masterClrMapping/>
   </p:clrMapOvr>
-  <mc:AlternateContent xmlns:mc="http://schemas.openxmlformats.org/markup-compatibility/2006">
-    <mc:Choice xmlns:p14="http://schemas.microsoft.com/office/powerpoint/2010/main" Requires="p14">
+  <mc:AlternateContent xmlns:mc="http://schemas.openxmlformats.org/markup-compatibility/2006" xmlns:p14="http://schemas.microsoft.com/office/powerpoint/2010/main">
+    <mc:Choice Requires="p14">
       <p:transition spd="med" p14:dur="700">
         <p:fade/>
       </p:transition>
     </mc:Choice>
-    <mc:Fallback>
+    <mc:Fallback xmlns="">
       <p:transition spd="med">
         <p:fade/>
       </p:transition>
@@ -5372,58 +6506,138 @@
             <p:ph idx="1"/>
           </p:nvPr>
         </p:nvSpPr>
-        <p:spPr/>
+        <p:spPr>
+          <a:xfrm>
+            <a:off x="838200" y="1825625"/>
+            <a:ext cx="3867150" cy="4351338"/>
+          </a:xfrm>
+        </p:spPr>
         <p:txBody>
           <a:bodyPr/>
           <a:lstStyle/>
           <a:p>
-            <a:r>
-              <a:rPr lang="fi-FI" dirty="0" err="1"/>
+            <a:pPr>
+              <a:lnSpc>
+                <a:spcPct val="150000"/>
+              </a:lnSpc>
+            </a:pPr>
+            <a:r>
+              <a:rPr lang="fi-FI" sz="2000" dirty="0" err="1"/>
               <a:t>Pydantic</a:t>
             </a:r>
             <a:r>
-              <a:rPr lang="fi-FI" dirty="0"/>
+              <a:rPr lang="fi-FI" sz="2000" dirty="0"/>
               <a:t> datamallinnus</a:t>
             </a:r>
           </a:p>
           <a:p>
-            <a:r>
-              <a:rPr lang="fi-FI" dirty="0"/>
-              <a:t>Datan haku </a:t>
-            </a:r>
-            <a:r>
-              <a:rPr lang="fi-FI" dirty="0" err="1"/>
-              <a:t>stockdata</a:t>
-            </a:r>
-            <a:r>
-              <a:rPr lang="fi-FI" dirty="0"/>
-              <a:t> apista</a:t>
-            </a:r>
-          </a:p>
-          <a:p>
-            <a:r>
-              <a:rPr lang="fi-FI" dirty="0"/>
-              <a:t>Post –pyyntö</a:t>
-            </a:r>
-          </a:p>
-          <a:p>
-            <a:r>
-              <a:rPr lang="fi-FI" dirty="0" err="1"/>
-              <a:t>Front-end</a:t>
-            </a:r>
-            <a:r>
-              <a:rPr lang="fi-FI" dirty="0"/>
-              <a:t> renderöinti</a:t>
-            </a:r>
-          </a:p>
-          <a:p>
-            <a:endParaRPr lang="fi-FI" dirty="0"/>
-          </a:p>
-          <a:p>
-            <a:endParaRPr lang="LID4096" dirty="0"/>
-          </a:p>
-        </p:txBody>
-      </p:sp>
+            <a:pPr lvl="1">
+              <a:lnSpc>
+                <a:spcPct val="150000"/>
+              </a:lnSpc>
+            </a:pPr>
+            <a:r>
+              <a:rPr lang="fi-FI" sz="1400" dirty="0"/>
+              <a:t>Ylempi kuva, </a:t>
+            </a:r>
+            <a:r>
+              <a:rPr lang="fi-FI" sz="1400" dirty="0" err="1"/>
+              <a:t>Porfolio</a:t>
+            </a:r>
+            <a:r>
+              <a:rPr lang="fi-FI" sz="1400" dirty="0"/>
+              <a:t> </a:t>
+            </a:r>
+            <a:r>
+              <a:rPr lang="fi-FI" sz="1400" dirty="0" err="1"/>
+              <a:t>objecti</a:t>
+            </a:r>
+            <a:r>
+              <a:rPr lang="fi-FI" sz="1400" dirty="0"/>
+              <a:t> –luokka ja </a:t>
+            </a:r>
+            <a:r>
+              <a:rPr lang="fi-FI" sz="1400" dirty="0" err="1"/>
+              <a:t>PortfolioBase</a:t>
+            </a:r>
+            <a:r>
+              <a:rPr lang="fi-FI" sz="1400" dirty="0"/>
+              <a:t> –luokka. </a:t>
+            </a:r>
+          </a:p>
+          <a:p>
+            <a:pPr lvl="1">
+              <a:lnSpc>
+                <a:spcPct val="150000"/>
+              </a:lnSpc>
+            </a:pPr>
+            <a:r>
+              <a:rPr lang="fi-FI" sz="1400" dirty="0"/>
+              <a:t>Alempi kuva, luokat otetaan käyttöön  main -tiedostossa</a:t>
+            </a:r>
+          </a:p>
+        </p:txBody>
+      </p:sp>
+      <p:pic>
+        <p:nvPicPr>
+          <p:cNvPr id="8" name="Kuva 7">
+            <a:extLst>
+              <a:ext uri="{FF2B5EF4-FFF2-40B4-BE49-F238E27FC236}">
+                <a16:creationId xmlns:a16="http://schemas.microsoft.com/office/drawing/2014/main" id="{4AAA5ED0-528F-DDBF-F4DF-06F6EDE5349C}"/>
+              </a:ext>
+            </a:extLst>
+          </p:cNvPr>
+          <p:cNvPicPr>
+            <a:picLocks noChangeAspect="1"/>
+          </p:cNvPicPr>
+          <p:nvPr/>
+        </p:nvPicPr>
+        <p:blipFill>
+          <a:blip r:embed="rId3"/>
+          <a:stretch>
+            <a:fillRect/>
+          </a:stretch>
+        </p:blipFill>
+        <p:spPr>
+          <a:xfrm>
+            <a:off x="4781550" y="1690688"/>
+            <a:ext cx="6496050" cy="2695575"/>
+          </a:xfrm>
+          <a:prstGeom prst="rect">
+            <a:avLst/>
+          </a:prstGeom>
+        </p:spPr>
+      </p:pic>
+      <p:pic>
+        <p:nvPicPr>
+          <p:cNvPr id="10" name="Kuva 9">
+            <a:extLst>
+              <a:ext uri="{FF2B5EF4-FFF2-40B4-BE49-F238E27FC236}">
+                <a16:creationId xmlns:a16="http://schemas.microsoft.com/office/drawing/2014/main" id="{6AF53A0B-34B6-31B3-E0A6-10572E87AFE1}"/>
+              </a:ext>
+            </a:extLst>
+          </p:cNvPr>
+          <p:cNvPicPr>
+            <a:picLocks noChangeAspect="1"/>
+          </p:cNvPicPr>
+          <p:nvPr/>
+        </p:nvPicPr>
+        <p:blipFill>
+          <a:blip r:embed="rId4"/>
+          <a:stretch>
+            <a:fillRect/>
+          </a:stretch>
+        </p:blipFill>
+        <p:spPr>
+          <a:xfrm>
+            <a:off x="3648075" y="4785518"/>
+            <a:ext cx="7705725" cy="1724025"/>
+          </a:xfrm>
+          <a:prstGeom prst="rect">
+            <a:avLst/>
+          </a:prstGeom>
+        </p:spPr>
+      </p:pic>
     </p:spTree>
     <p:extLst>
       <p:ext uri="{BB962C8B-B14F-4D97-AF65-F5344CB8AC3E}">
@@ -5459,7 +6673,7 @@
           <p:cNvPr id="4" name="Picture 45">
             <a:extLst>
               <a:ext uri="{FF2B5EF4-FFF2-40B4-BE49-F238E27FC236}">
-                <a16:creationId xmlns:a16="http://schemas.microsoft.com/office/drawing/2014/main" id="{99DE5C58-3578-70DA-6AE9-50661CC674A5}"/>
+                <a16:creationId xmlns:a16="http://schemas.microsoft.com/office/drawing/2014/main" id="{8FFB8CDF-51E7-0D9F-CDCB-19C4798D6344}"/>
               </a:ext>
             </a:extLst>
           </p:cNvPr>
@@ -5484,7 +6698,7 @@
         </p:blipFill>
         <p:spPr>
           <a:xfrm>
-            <a:off x="19" y="0"/>
+            <a:off x="19" y="11"/>
             <a:ext cx="12191981" cy="6857989"/>
           </a:xfrm>
           <a:prstGeom prst="rect">
@@ -5497,7 +6711,7 @@
           <p:cNvPr id="2" name="Otsikko 1">
             <a:extLst>
               <a:ext uri="{FF2B5EF4-FFF2-40B4-BE49-F238E27FC236}">
-                <a16:creationId xmlns:a16="http://schemas.microsoft.com/office/drawing/2014/main" id="{AA8F6DCE-FAC4-2E9E-6872-F5440D09E0F7}"/>
+                <a16:creationId xmlns:a16="http://schemas.microsoft.com/office/drawing/2014/main" id="{BE431D21-8862-60A5-5122-A1276708A3A9}"/>
               </a:ext>
             </a:extLst>
           </p:cNvPr>
@@ -5515,7 +6729,7 @@
           <a:p>
             <a:r>
               <a:rPr lang="fi-FI" dirty="0"/>
-              <a:t>Demo työn toiminnasta</a:t>
+              <a:t>Koodiesimerkit, ratkaisun esittely</a:t>
             </a:r>
             <a:endParaRPr lang="LID4096" dirty="0"/>
           </a:p>
@@ -5526,7 +6740,7 @@
           <p:cNvPr id="3" name="Sisällön paikkamerkki 2">
             <a:extLst>
               <a:ext uri="{FF2B5EF4-FFF2-40B4-BE49-F238E27FC236}">
-                <a16:creationId xmlns:a16="http://schemas.microsoft.com/office/drawing/2014/main" id="{8D951615-1B27-F13E-AC73-506FF12E1EC7}"/>
+                <a16:creationId xmlns:a16="http://schemas.microsoft.com/office/drawing/2014/main" id="{92EF7534-1E9C-0F8B-42D8-338290E58D20}"/>
               </a:ext>
             </a:extLst>
           </p:cNvPr>
@@ -5537,35 +6751,134 @@
             <p:ph idx="1"/>
           </p:nvPr>
         </p:nvSpPr>
-        <p:spPr/>
+        <p:spPr>
+          <a:xfrm>
+            <a:off x="838200" y="1825625"/>
+            <a:ext cx="4162425" cy="4351338"/>
+          </a:xfrm>
+        </p:spPr>
         <p:txBody>
           <a:bodyPr/>
           <a:lstStyle/>
           <a:p>
-            <a:r>
-              <a:rPr lang="fi-FI" dirty="0"/>
-              <a:t>Sovelluksen avaus</a:t>
-            </a:r>
-          </a:p>
-          <a:p>
-            <a:r>
-              <a:rPr lang="fi-FI" dirty="0"/>
-              <a:t>Välilehdet</a:t>
-            </a:r>
-          </a:p>
-          <a:p>
-            <a:r>
-              <a:rPr lang="fi-FI" dirty="0"/>
-              <a:t>CRUD operaatiot</a:t>
-            </a:r>
+            <a:pPr>
+              <a:lnSpc>
+                <a:spcPct val="150000"/>
+              </a:lnSpc>
+            </a:pPr>
+            <a:r>
+              <a:rPr lang="fi-FI" sz="2000" dirty="0"/>
+              <a:t>Datan haku </a:t>
+            </a:r>
+            <a:r>
+              <a:rPr lang="fi-FI" sz="2000" dirty="0" err="1"/>
+              <a:t>stockdata</a:t>
+            </a:r>
+            <a:r>
+              <a:rPr lang="fi-FI" sz="2000" dirty="0"/>
+              <a:t> apista</a:t>
+            </a:r>
+          </a:p>
+          <a:p>
+            <a:pPr lvl="1">
+              <a:lnSpc>
+                <a:spcPct val="150000"/>
+              </a:lnSpc>
+            </a:pPr>
+            <a:r>
+              <a:rPr lang="fi-FI" sz="1600" dirty="0"/>
+              <a:t>Valittujen osakkeiden TICKER –lista</a:t>
+            </a:r>
+          </a:p>
+          <a:p>
+            <a:pPr lvl="1">
+              <a:lnSpc>
+                <a:spcPct val="150000"/>
+              </a:lnSpc>
+            </a:pPr>
+            <a:r>
+              <a:rPr lang="fi-FI" sz="1600" dirty="0"/>
+              <a:t>HTTP –</a:t>
+            </a:r>
+            <a:r>
+              <a:rPr lang="fi-FI" sz="1600" dirty="0" err="1"/>
+              <a:t>get</a:t>
+            </a:r>
+            <a:r>
+              <a:rPr lang="fi-FI" sz="1600" dirty="0"/>
+              <a:t> pyynnöllä </a:t>
+            </a:r>
+            <a:r>
+              <a:rPr lang="fi-FI" sz="1600" dirty="0" err="1"/>
+              <a:t>APIsta</a:t>
+            </a:r>
+            <a:r>
+              <a:rPr lang="fi-FI" sz="1600" dirty="0"/>
+              <a:t> </a:t>
+            </a:r>
+            <a:r>
+              <a:rPr lang="fi-FI" sz="1600" dirty="0" err="1"/>
+              <a:t>response</a:t>
+            </a:r>
+            <a:endParaRPr lang="fi-FI" sz="1600" dirty="0"/>
+          </a:p>
+          <a:p>
+            <a:pPr lvl="1">
+              <a:lnSpc>
+                <a:spcPct val="150000"/>
+              </a:lnSpc>
+            </a:pPr>
+            <a:r>
+              <a:rPr lang="fi-FI" sz="1600" dirty="0" err="1"/>
+              <a:t>Response</a:t>
+            </a:r>
+            <a:r>
+              <a:rPr lang="fi-FI" sz="1600" dirty="0"/>
+              <a:t> datan parsiminen ja valikoidun datan tallentaminen uuteen listaan. </a:t>
+            </a:r>
+          </a:p>
+          <a:p>
+            <a:endParaRPr lang="fi-FI" dirty="0"/>
+          </a:p>
+          <a:p>
             <a:endParaRPr lang="LID4096" dirty="0"/>
           </a:p>
         </p:txBody>
       </p:sp>
+      <p:pic>
+        <p:nvPicPr>
+          <p:cNvPr id="7" name="Kuva 6">
+            <a:extLst>
+              <a:ext uri="{FF2B5EF4-FFF2-40B4-BE49-F238E27FC236}">
+                <a16:creationId xmlns:a16="http://schemas.microsoft.com/office/drawing/2014/main" id="{211258E7-0D15-6F72-C96B-A04253E19E49}"/>
+              </a:ext>
+            </a:extLst>
+          </p:cNvPr>
+          <p:cNvPicPr>
+            <a:picLocks noChangeAspect="1"/>
+          </p:cNvPicPr>
+          <p:nvPr/>
+        </p:nvPicPr>
+        <p:blipFill>
+          <a:blip r:embed="rId3"/>
+          <a:stretch>
+            <a:fillRect/>
+          </a:stretch>
+        </p:blipFill>
+        <p:spPr>
+          <a:xfrm>
+            <a:off x="5694875" y="1314450"/>
+            <a:ext cx="5068538" cy="5543539"/>
+          </a:xfrm>
+          <a:prstGeom prst="rect">
+            <a:avLst/>
+          </a:prstGeom>
+        </p:spPr>
+      </p:pic>
     </p:spTree>
     <p:extLst>
       <p:ext uri="{BB962C8B-B14F-4D97-AF65-F5344CB8AC3E}">
-        <p14:creationId xmlns:p14="http://schemas.microsoft.com/office/powerpoint/2010/main" val="3728030655"/>
+        <p14:creationId xmlns:p14="http://schemas.microsoft.com/office/powerpoint/2010/main" val="3887204565"/>
       </p:ext>
     </p:extLst>
   </p:cSld>
@@ -5597,7 +6910,7 @@
           <p:cNvPr id="4" name="Picture 45">
             <a:extLst>
               <a:ext uri="{FF2B5EF4-FFF2-40B4-BE49-F238E27FC236}">
-                <a16:creationId xmlns:a16="http://schemas.microsoft.com/office/drawing/2014/main" id="{84CEB8D4-FA48-FEAD-C838-AB0924A7FF15}"/>
+                <a16:creationId xmlns:a16="http://schemas.microsoft.com/office/drawing/2014/main" id="{8FFB8CDF-51E7-0D9F-CDCB-19C4798D6344}"/>
               </a:ext>
             </a:extLst>
           </p:cNvPr>
@@ -5622,7 +6935,7 @@
         </p:blipFill>
         <p:spPr>
           <a:xfrm>
-            <a:off x="0" y="0"/>
+            <a:off x="19" y="11"/>
             <a:ext cx="12191981" cy="6857989"/>
           </a:xfrm>
           <a:prstGeom prst="rect">
@@ -5635,7 +6948,7 @@
           <p:cNvPr id="2" name="Otsikko 1">
             <a:extLst>
               <a:ext uri="{FF2B5EF4-FFF2-40B4-BE49-F238E27FC236}">
-                <a16:creationId xmlns:a16="http://schemas.microsoft.com/office/drawing/2014/main" id="{5B3ADFCB-E46C-FF1D-6B43-1F4C3E41390F}"/>
+                <a16:creationId xmlns:a16="http://schemas.microsoft.com/office/drawing/2014/main" id="{BE431D21-8862-60A5-5122-A1276708A3A9}"/>
               </a:ext>
             </a:extLst>
           </p:cNvPr>
@@ -5653,7 +6966,7 @@
           <a:p>
             <a:r>
               <a:rPr lang="fi-FI" dirty="0"/>
-              <a:t>Projektityökalut</a:t>
+              <a:t>Koodiesimerkit, ratkaisun esittely</a:t>
             </a:r>
             <a:endParaRPr lang="LID4096" dirty="0"/>
           </a:p>
@@ -5664,7 +6977,7 @@
           <p:cNvPr id="3" name="Sisällön paikkamerkki 2">
             <a:extLst>
               <a:ext uri="{FF2B5EF4-FFF2-40B4-BE49-F238E27FC236}">
-                <a16:creationId xmlns:a16="http://schemas.microsoft.com/office/drawing/2014/main" id="{C127DD7C-41F7-2596-2659-617CA9F40961}"/>
+                <a16:creationId xmlns:a16="http://schemas.microsoft.com/office/drawing/2014/main" id="{92EF7534-1E9C-0F8B-42D8-338290E58D20}"/>
               </a:ext>
             </a:extLst>
           </p:cNvPr>
@@ -5675,87 +6988,103 @@
             <p:ph idx="1"/>
           </p:nvPr>
         </p:nvSpPr>
-        <p:spPr/>
+        <p:spPr>
+          <a:xfrm>
+            <a:off x="838200" y="1825625"/>
+            <a:ext cx="3038475" cy="4351338"/>
+          </a:xfrm>
+        </p:spPr>
         <p:txBody>
           <a:bodyPr/>
           <a:lstStyle/>
           <a:p>
-            <a:r>
-              <a:rPr lang="fi-FI" dirty="0" err="1"/>
-              <a:t>Github</a:t>
-            </a:r>
-            <a:r>
-              <a:rPr lang="fi-FI" dirty="0"/>
-              <a:t> -versionhallinta	</a:t>
-            </a:r>
-          </a:p>
-          <a:p>
-            <a:r>
-              <a:rPr lang="fi-FI" dirty="0"/>
-              <a:t>Testaus? – </a:t>
-            </a:r>
-            <a:r>
-              <a:rPr lang="fi-FI" dirty="0" err="1"/>
-              <a:t>FastAPI:n</a:t>
-            </a:r>
-            <a:r>
-              <a:rPr lang="fi-FI" dirty="0"/>
-              <a:t> dokumentaatio ja </a:t>
-            </a:r>
-            <a:r>
-              <a:rPr lang="fi-FI" dirty="0" err="1"/>
-              <a:t>konsolilogaus</a:t>
-            </a:r>
-            <a:r>
-              <a:rPr lang="fi-FI" dirty="0"/>
-              <a:t> testaus</a:t>
-            </a:r>
-          </a:p>
-          <a:p>
-            <a:r>
-              <a:rPr lang="fi-FI" dirty="0" err="1"/>
-              <a:t>Discord</a:t>
-            </a:r>
-            <a:r>
-              <a:rPr lang="fi-FI" dirty="0"/>
-              <a:t> kommunikaatioon</a:t>
-            </a:r>
-          </a:p>
-          <a:p>
-            <a:r>
-              <a:rPr lang="fi-FI" dirty="0"/>
-              <a:t>Videopalaverit</a:t>
-            </a:r>
-          </a:p>
-          <a:p>
-            <a:r>
-              <a:rPr lang="fi-FI" dirty="0" err="1"/>
-              <a:t>StackOverflow</a:t>
-            </a:r>
+            <a:pPr>
+              <a:lnSpc>
+                <a:spcPct val="150000"/>
+              </a:lnSpc>
+            </a:pPr>
+            <a:r>
+              <a:rPr lang="fi-FI" sz="2000" dirty="0"/>
+              <a:t>PUT –</a:t>
+            </a:r>
+            <a:r>
+              <a:rPr lang="fi-FI" sz="2000" dirty="0" err="1"/>
+              <a:t>endpointin</a:t>
+            </a:r>
+            <a:r>
+              <a:rPr lang="fi-FI" sz="2000" dirty="0"/>
+              <a:t> määrity </a:t>
+            </a:r>
+            <a:r>
+              <a:rPr lang="fi-FI" sz="2000" dirty="0" err="1"/>
+              <a:t>backendin</a:t>
+            </a:r>
+            <a:r>
+              <a:rPr lang="fi-FI" sz="2000" dirty="0"/>
+              <a:t> puolella</a:t>
+            </a:r>
+          </a:p>
+          <a:p>
+            <a:pPr>
+              <a:lnSpc>
+                <a:spcPct val="150000"/>
+              </a:lnSpc>
+            </a:pPr>
+            <a:r>
+              <a:rPr lang="fi-FI" sz="2000" dirty="0"/>
+              <a:t>Pyytää parametrina </a:t>
+            </a:r>
+            <a:r>
+              <a:rPr lang="fi-FI" sz="2000" dirty="0" err="1"/>
+              <a:t>frontendiltä</a:t>
+            </a:r>
+            <a:r>
+              <a:rPr lang="fi-FI" sz="2000" dirty="0"/>
+              <a:t> datan tietystä portfoliosta, jonka laskettu arvo päivitetään tietokantaan</a:t>
+            </a:r>
+          </a:p>
+          <a:p>
             <a:endParaRPr lang="fi-FI" dirty="0"/>
           </a:p>
           <a:p>
-            <a:pPr lvl="1"/>
-            <a:r>
-              <a:rPr lang="fi-FI" dirty="0"/>
-              <a:t>Muut foorumit</a:t>
-            </a:r>
-          </a:p>
-          <a:p>
-            <a:endParaRPr lang="fi-FI" dirty="0"/>
-          </a:p>
-          <a:p>
-            <a:endParaRPr lang="fi-FI" dirty="0"/>
-          </a:p>
-          <a:p>
             <a:endParaRPr lang="LID4096" dirty="0"/>
           </a:p>
         </p:txBody>
       </p:sp>
+      <p:pic>
+        <p:nvPicPr>
+          <p:cNvPr id="7" name="Kuva 6">
+            <a:extLst>
+              <a:ext uri="{FF2B5EF4-FFF2-40B4-BE49-F238E27FC236}">
+                <a16:creationId xmlns:a16="http://schemas.microsoft.com/office/drawing/2014/main" id="{DDD39C88-043F-13DD-3C64-6C66939EDD68}"/>
+              </a:ext>
+            </a:extLst>
+          </p:cNvPr>
+          <p:cNvPicPr>
+            <a:picLocks noChangeAspect="1"/>
+          </p:cNvPicPr>
+          <p:nvPr/>
+        </p:nvPicPr>
+        <p:blipFill>
+          <a:blip r:embed="rId3"/>
+          <a:stretch>
+            <a:fillRect/>
+          </a:stretch>
+        </p:blipFill>
+        <p:spPr>
+          <a:xfrm>
+            <a:off x="3700462" y="1825625"/>
+            <a:ext cx="8420100" cy="2724150"/>
+          </a:xfrm>
+          <a:prstGeom prst="rect">
+            <a:avLst/>
+          </a:prstGeom>
+        </p:spPr>
+      </p:pic>
     </p:spTree>
     <p:extLst>
       <p:ext uri="{BB962C8B-B14F-4D97-AF65-F5344CB8AC3E}">
-        <p14:creationId xmlns:p14="http://schemas.microsoft.com/office/powerpoint/2010/main" val="899089043"/>
+        <p14:creationId xmlns:p14="http://schemas.microsoft.com/office/powerpoint/2010/main" val="521620059"/>
       </p:ext>
     </p:extLst>
   </p:cSld>

</xml_diff>